<commit_message>
Added dev up provided slides
</commit_message>
<xml_diff>
--- a/Mutation Testing - 2022.pptx
+++ b/Mutation Testing - 2022.pptx
@@ -5,34 +5,36 @@
     <p:sldMasterId id="2147483708" r:id="rId4"/>
   </p:sldMasterIdLst>
   <p:notesMasterIdLst>
-    <p:notesMasterId r:id="rId27"/>
+    <p:notesMasterId r:id="rId29"/>
   </p:notesMasterIdLst>
   <p:handoutMasterIdLst>
-    <p:handoutMasterId r:id="rId28"/>
+    <p:handoutMasterId r:id="rId30"/>
   </p:handoutMasterIdLst>
   <p:sldIdLst>
     <p:sldId id="258" r:id="rId5"/>
-    <p:sldId id="259" r:id="rId6"/>
-    <p:sldId id="263" r:id="rId7"/>
-    <p:sldId id="264" r:id="rId8"/>
-    <p:sldId id="265" r:id="rId9"/>
-    <p:sldId id="277" r:id="rId10"/>
-    <p:sldId id="281" r:id="rId11"/>
-    <p:sldId id="268" r:id="rId12"/>
-    <p:sldId id="267" r:id="rId13"/>
-    <p:sldId id="278" r:id="rId14"/>
-    <p:sldId id="282" r:id="rId15"/>
-    <p:sldId id="276" r:id="rId16"/>
-    <p:sldId id="273" r:id="rId17"/>
-    <p:sldId id="272" r:id="rId18"/>
-    <p:sldId id="274" r:id="rId19"/>
-    <p:sldId id="275" r:id="rId20"/>
-    <p:sldId id="280" r:id="rId21"/>
-    <p:sldId id="266" r:id="rId22"/>
-    <p:sldId id="270" r:id="rId23"/>
-    <p:sldId id="279" r:id="rId24"/>
-    <p:sldId id="269" r:id="rId25"/>
-    <p:sldId id="271" r:id="rId26"/>
+    <p:sldId id="283" r:id="rId6"/>
+    <p:sldId id="284" r:id="rId7"/>
+    <p:sldId id="259" r:id="rId8"/>
+    <p:sldId id="263" r:id="rId9"/>
+    <p:sldId id="264" r:id="rId10"/>
+    <p:sldId id="265" r:id="rId11"/>
+    <p:sldId id="277" r:id="rId12"/>
+    <p:sldId id="281" r:id="rId13"/>
+    <p:sldId id="268" r:id="rId14"/>
+    <p:sldId id="267" r:id="rId15"/>
+    <p:sldId id="278" r:id="rId16"/>
+    <p:sldId id="282" r:id="rId17"/>
+    <p:sldId id="276" r:id="rId18"/>
+    <p:sldId id="273" r:id="rId19"/>
+    <p:sldId id="272" r:id="rId20"/>
+    <p:sldId id="274" r:id="rId21"/>
+    <p:sldId id="275" r:id="rId22"/>
+    <p:sldId id="280" r:id="rId23"/>
+    <p:sldId id="266" r:id="rId24"/>
+    <p:sldId id="270" r:id="rId25"/>
+    <p:sldId id="279" r:id="rId26"/>
+    <p:sldId id="269" r:id="rId27"/>
+    <p:sldId id="271" r:id="rId28"/>
   </p:sldIdLst>
   <p:sldSz cx="12192000" cy="6858000"/>
   <p:notesSz cx="7010400" cy="9296400"/>
@@ -540,7 +542,7 @@
           <a:p>
             <a:fld id="{8906F081-8781-4431-8FD4-2CF608CD7C47}" type="datetimeFigureOut">
               <a:rPr lang="en-US" smtClean="0"/>
-              <a:t>4/15/2022</a:t>
+              <a:t>6/6/22</a:t>
             </a:fld>
             <a:endParaRPr lang="en-US"/>
           </a:p>
@@ -705,7 +707,7 @@
           <a:p>
             <a:fld id="{F06CA47C-B7FD-4BE9-B0E6-81BA758D95F2}" type="datetimeFigureOut">
               <a:rPr lang="en-US" smtClean="0"/>
-              <a:t>4/15/2022</a:t>
+              <a:t>6/6/22</a:t>
             </a:fld>
             <a:endParaRPr lang="en-US"/>
           </a:p>
@@ -1124,7 +1126,7 @@
           <a:p>
             <a:fld id="{923716F0-385D-4F6E-BE54-A09D410D24C2}" type="slidenum">
               <a:rPr lang="en-US" smtClean="0"/>
-              <a:t>10</a:t>
+              <a:t>12</a:t>
             </a:fld>
             <a:endParaRPr lang="en-US"/>
           </a:p>
@@ -1211,7 +1213,7 @@
           <a:p>
             <a:fld id="{923716F0-385D-4F6E-BE54-A09D410D24C2}" type="slidenum">
               <a:rPr lang="en-US" smtClean="0"/>
-              <a:t>11</a:t>
+              <a:t>13</a:t>
             </a:fld>
             <a:endParaRPr lang="en-US"/>
           </a:p>
@@ -1298,7 +1300,7 @@
           <a:p>
             <a:fld id="{923716F0-385D-4F6E-BE54-A09D410D24C2}" type="slidenum">
               <a:rPr lang="en-US" smtClean="0"/>
-              <a:t>12</a:t>
+              <a:t>14</a:t>
             </a:fld>
             <a:endParaRPr lang="en-US"/>
           </a:p>
@@ -1385,7 +1387,7 @@
           <a:p>
             <a:fld id="{923716F0-385D-4F6E-BE54-A09D410D24C2}" type="slidenum">
               <a:rPr lang="en-US" smtClean="0"/>
-              <a:t>13</a:t>
+              <a:t>15</a:t>
             </a:fld>
             <a:endParaRPr lang="en-US"/>
           </a:p>
@@ -1469,7 +1471,7 @@
           <a:p>
             <a:fld id="{923716F0-385D-4F6E-BE54-A09D410D24C2}" type="slidenum">
               <a:rPr lang="en-US" smtClean="0"/>
-              <a:t>14</a:t>
+              <a:t>16</a:t>
             </a:fld>
             <a:endParaRPr lang="en-US"/>
           </a:p>
@@ -1553,7 +1555,7 @@
           <a:p>
             <a:fld id="{923716F0-385D-4F6E-BE54-A09D410D24C2}" type="slidenum">
               <a:rPr lang="en-US" smtClean="0"/>
-              <a:t>15</a:t>
+              <a:t>17</a:t>
             </a:fld>
             <a:endParaRPr lang="en-US"/>
           </a:p>
@@ -1646,7 +1648,7 @@
           <a:p>
             <a:fld id="{923716F0-385D-4F6E-BE54-A09D410D24C2}" type="slidenum">
               <a:rPr lang="en-US" smtClean="0"/>
-              <a:t>16</a:t>
+              <a:t>18</a:t>
             </a:fld>
             <a:endParaRPr lang="en-US"/>
           </a:p>
@@ -1730,7 +1732,7 @@
           <a:p>
             <a:fld id="{923716F0-385D-4F6E-BE54-A09D410D24C2}" type="slidenum">
               <a:rPr lang="en-US" smtClean="0"/>
-              <a:t>17</a:t>
+              <a:t>19</a:t>
             </a:fld>
             <a:endParaRPr lang="en-US"/>
           </a:p>
@@ -1858,7 +1860,7 @@
           <a:p>
             <a:fld id="{923716F0-385D-4F6E-BE54-A09D410D24C2}" type="slidenum">
               <a:rPr lang="en-US" smtClean="0"/>
-              <a:t>18</a:t>
+              <a:t>20</a:t>
             </a:fld>
             <a:endParaRPr lang="en-US"/>
           </a:p>
@@ -1942,7 +1944,7 @@
           <a:p>
             <a:fld id="{923716F0-385D-4F6E-BE54-A09D410D24C2}" type="slidenum">
               <a:rPr lang="en-US" smtClean="0"/>
-              <a:t>19</a:t>
+              <a:t>21</a:t>
             </a:fld>
             <a:endParaRPr lang="en-US"/>
           </a:p>
@@ -2026,7 +2028,7 @@
           <a:p>
             <a:fld id="{923716F0-385D-4F6E-BE54-A09D410D24C2}" type="slidenum">
               <a:rPr lang="en-US" smtClean="0"/>
-              <a:t>2</a:t>
+              <a:t>4</a:t>
             </a:fld>
             <a:endParaRPr lang="en-US"/>
           </a:p>
@@ -2110,7 +2112,7 @@
           <a:p>
             <a:fld id="{923716F0-385D-4F6E-BE54-A09D410D24C2}" type="slidenum">
               <a:rPr lang="en-US" smtClean="0"/>
-              <a:t>20</a:t>
+              <a:t>22</a:t>
             </a:fld>
             <a:endParaRPr lang="en-US"/>
           </a:p>
@@ -2194,7 +2196,7 @@
           <a:p>
             <a:fld id="{923716F0-385D-4F6E-BE54-A09D410D24C2}" type="slidenum">
               <a:rPr lang="en-US" smtClean="0"/>
-              <a:t>21</a:t>
+              <a:t>23</a:t>
             </a:fld>
             <a:endParaRPr lang="en-US"/>
           </a:p>
@@ -2278,7 +2280,7 @@
           <a:p>
             <a:fld id="{923716F0-385D-4F6E-BE54-A09D410D24C2}" type="slidenum">
               <a:rPr lang="en-US" smtClean="0"/>
-              <a:t>22</a:t>
+              <a:t>24</a:t>
             </a:fld>
             <a:endParaRPr lang="en-US"/>
           </a:p>
@@ -2400,7 +2402,7 @@
           <a:p>
             <a:fld id="{923716F0-385D-4F6E-BE54-A09D410D24C2}" type="slidenum">
               <a:rPr lang="en-US" smtClean="0"/>
-              <a:t>3</a:t>
+              <a:t>5</a:t>
             </a:fld>
             <a:endParaRPr lang="en-US"/>
           </a:p>
@@ -2487,7 +2489,7 @@
           <a:p>
             <a:fld id="{923716F0-385D-4F6E-BE54-A09D410D24C2}" type="slidenum">
               <a:rPr lang="en-US" smtClean="0"/>
-              <a:t>4</a:t>
+              <a:t>6</a:t>
             </a:fld>
             <a:endParaRPr lang="en-US"/>
           </a:p>
@@ -2571,7 +2573,7 @@
           <a:p>
             <a:fld id="{923716F0-385D-4F6E-BE54-A09D410D24C2}" type="slidenum">
               <a:rPr lang="en-US" smtClean="0"/>
-              <a:t>5</a:t>
+              <a:t>7</a:t>
             </a:fld>
             <a:endParaRPr lang="en-US"/>
           </a:p>
@@ -2679,7 +2681,7 @@
           <a:p>
             <a:fld id="{923716F0-385D-4F6E-BE54-A09D410D24C2}" type="slidenum">
               <a:rPr lang="en-US" smtClean="0"/>
-              <a:t>6</a:t>
+              <a:t>8</a:t>
             </a:fld>
             <a:endParaRPr lang="en-US"/>
           </a:p>
@@ -2772,7 +2774,7 @@
           <a:p>
             <a:fld id="{923716F0-385D-4F6E-BE54-A09D410D24C2}" type="slidenum">
               <a:rPr lang="en-US" smtClean="0"/>
-              <a:t>7</a:t>
+              <a:t>9</a:t>
             </a:fld>
             <a:endParaRPr lang="en-US"/>
           </a:p>
@@ -2856,7 +2858,7 @@
           <a:p>
             <a:fld id="{923716F0-385D-4F6E-BE54-A09D410D24C2}" type="slidenum">
               <a:rPr lang="en-US" smtClean="0"/>
-              <a:t>8</a:t>
+              <a:t>10</a:t>
             </a:fld>
             <a:endParaRPr lang="en-US"/>
           </a:p>
@@ -2991,7 +2993,7 @@
           <a:p>
             <a:fld id="{923716F0-385D-4F6E-BE54-A09D410D24C2}" type="slidenum">
               <a:rPr lang="en-US" smtClean="0"/>
-              <a:t>9</a:t>
+              <a:t>11</a:t>
             </a:fld>
             <a:endParaRPr lang="en-US"/>
           </a:p>
@@ -3178,7 +3180,7 @@
           <a:p>
             <a:fld id="{33024136-D290-48F3-A182-4C46BEB5146B}" type="datetime1">
               <a:rPr lang="en-US" smtClean="0"/>
-              <a:t>4/15/2022</a:t>
+              <a:t>6/6/22</a:t>
             </a:fld>
             <a:endParaRPr lang="en-US" dirty="0"/>
           </a:p>
@@ -3460,7 +3462,7 @@
           <a:p>
             <a:fld id="{4CD11720-76E7-46E6-B0AA-057287C42052}" type="datetime1">
               <a:rPr lang="en-US" smtClean="0"/>
-              <a:t>4/15/2022</a:t>
+              <a:t>6/6/22</a:t>
             </a:fld>
             <a:endParaRPr lang="en-US" dirty="0"/>
           </a:p>
@@ -3699,7 +3701,7 @@
           <a:p>
             <a:fld id="{4CD11720-76E7-46E6-B0AA-057287C42052}" type="datetime1">
               <a:rPr lang="en-US" smtClean="0"/>
-              <a:t>4/15/2022</a:t>
+              <a:t>6/6/22</a:t>
             </a:fld>
             <a:endParaRPr lang="en-US" dirty="0"/>
           </a:p>
@@ -4017,7 +4019,7 @@
           <a:p>
             <a:fld id="{4CD11720-76E7-46E6-B0AA-057287C42052}" type="datetime1">
               <a:rPr lang="en-US" smtClean="0"/>
-              <a:t>4/15/2022</a:t>
+              <a:t>6/6/22</a:t>
             </a:fld>
             <a:endParaRPr lang="en-US" dirty="0"/>
           </a:p>
@@ -4498,7 +4500,7 @@
           <a:p>
             <a:fld id="{4CD11720-76E7-46E6-B0AA-057287C42052}" type="datetime1">
               <a:rPr lang="en-US" smtClean="0"/>
-              <a:t>4/15/2022</a:t>
+              <a:t>6/6/22</a:t>
             </a:fld>
             <a:endParaRPr lang="en-US" dirty="0"/>
           </a:p>
@@ -5051,7 +5053,7 @@
           <a:p>
             <a:fld id="{4CD11720-76E7-46E6-B0AA-057287C42052}" type="datetime1">
               <a:rPr lang="en-US" smtClean="0"/>
-              <a:t>4/15/2022</a:t>
+              <a:t>6/6/22</a:t>
             </a:fld>
             <a:endParaRPr lang="en-US" dirty="0"/>
           </a:p>
@@ -5831,7 +5833,7 @@
           <a:p>
             <a:fld id="{4CD11720-76E7-46E6-B0AA-057287C42052}" type="datetime1">
               <a:rPr lang="en-US" smtClean="0"/>
-              <a:t>4/15/2022</a:t>
+              <a:t>6/6/22</a:t>
             </a:fld>
             <a:endParaRPr lang="en-US" dirty="0"/>
           </a:p>
@@ -6012,7 +6014,7 @@
           <a:p>
             <a:fld id="{9CC7D44C-38B1-4D0F-9006-D5774F331095}" type="datetime1">
               <a:rPr lang="en-US" smtClean="0"/>
-              <a:t>4/15/2022</a:t>
+              <a:t>6/6/22</a:t>
             </a:fld>
             <a:endParaRPr lang="en-US"/>
           </a:p>
@@ -6251,7 +6253,7 @@
           <a:p>
             <a:fld id="{F98D518A-FD4F-4358-B95B-9DB5A17160FB}" type="datetime1">
               <a:rPr lang="en-US" smtClean="0"/>
-              <a:t>4/15/2022</a:t>
+              <a:t>6/6/22</a:t>
             </a:fld>
             <a:endParaRPr lang="en-US"/>
           </a:p>
@@ -6465,7 +6467,7 @@
           <a:p>
             <a:fld id="{5E2A9F4F-03AD-4497-A65D-076601BD41D2}" type="datetime1">
               <a:rPr lang="en-US" smtClean="0"/>
-              <a:t>4/15/2022</a:t>
+              <a:t>6/6/22</a:t>
             </a:fld>
             <a:endParaRPr lang="en-US"/>
           </a:p>
@@ -6770,7 +6772,7 @@
           <a:p>
             <a:fld id="{EDFBF3AC-A781-43AA-8BD5-B12F49168B94}" type="datetime1">
               <a:rPr lang="en-US" smtClean="0"/>
-              <a:t>4/15/2022</a:t>
+              <a:t>6/6/22</a:t>
             </a:fld>
             <a:endParaRPr lang="en-US"/>
           </a:p>
@@ -7063,7 +7065,7 @@
           <a:p>
             <a:fld id="{C5256A41-C91B-43FF-9881-F5DA9878418F}" type="datetime1">
               <a:rPr lang="en-US" smtClean="0"/>
-              <a:t>4/15/2022</a:t>
+              <a:t>6/6/22</a:t>
             </a:fld>
             <a:endParaRPr lang="en-US"/>
           </a:p>
@@ -7493,7 +7495,7 @@
           <a:p>
             <a:fld id="{FFD7AA76-41EE-4C13-950E-E611B8B8FC52}" type="datetime1">
               <a:rPr lang="en-US" smtClean="0"/>
-              <a:t>4/15/2022</a:t>
+              <a:t>6/6/22</a:t>
             </a:fld>
             <a:endParaRPr lang="en-US"/>
           </a:p>
@@ -7627,7 +7629,7 @@
           <a:p>
             <a:fld id="{89407A26-E7BC-4498-97E4-87AF12377CA9}" type="datetime1">
               <a:rPr lang="en-US" smtClean="0"/>
-              <a:t>4/15/2022</a:t>
+              <a:t>6/6/22</a:t>
             </a:fld>
             <a:endParaRPr lang="en-US"/>
           </a:p>
@@ -7739,7 +7741,7 @@
           <a:p>
             <a:fld id="{93EA4171-1117-4486-993C-35A7470D8847}" type="datetime1">
               <a:rPr lang="en-US" smtClean="0"/>
-              <a:t>4/15/2022</a:t>
+              <a:t>6/6/22</a:t>
             </a:fld>
             <a:endParaRPr lang="en-US"/>
           </a:p>
@@ -8022,7 +8024,7 @@
           <a:p>
             <a:fld id="{472A4CB8-1563-4663-81DB-74EB416C19BE}" type="datetime1">
               <a:rPr lang="en-US" smtClean="0"/>
-              <a:t>4/15/2022</a:t>
+              <a:t>6/6/22</a:t>
             </a:fld>
             <a:endParaRPr lang="en-US"/>
           </a:p>
@@ -8296,7 +8298,7 @@
           <a:p>
             <a:fld id="{0C6724CE-2468-448B-87C1-A92EDD78369B}" type="datetime1">
               <a:rPr lang="en-US" smtClean="0"/>
-              <a:t>4/15/2022</a:t>
+              <a:t>6/6/22</a:t>
             </a:fld>
             <a:endParaRPr lang="en-US"/>
           </a:p>
@@ -8604,7 +8606,7 @@
           <a:p>
             <a:fld id="{4CD11720-76E7-46E6-B0AA-057287C42052}" type="datetime1">
               <a:rPr lang="en-US" smtClean="0"/>
-              <a:t>4/15/2022</a:t>
+              <a:t>6/6/22</a:t>
             </a:fld>
             <a:endParaRPr lang="en-US" dirty="0"/>
           </a:p>
@@ -9124,6 +9126,622 @@
       </p:grpSpPr>
       <p:sp>
         <p:nvSpPr>
+          <p:cNvPr id="13" name="Title 12"/>
+          <p:cNvSpPr>
+            <a:spLocks noGrp="1"/>
+          </p:cNvSpPr>
+          <p:nvPr>
+            <p:ph type="title"/>
+          </p:nvPr>
+        </p:nvSpPr>
+        <p:spPr/>
+        <p:txBody>
+          <a:bodyPr/>
+          <a:lstStyle/>
+          <a:p>
+            <a:r>
+              <a:rPr lang="en-US" dirty="0"/>
+              <a:t>Mutation Testing Tools</a:t>
+            </a:r>
+          </a:p>
+        </p:txBody>
+      </p:sp>
+      <p:sp>
+        <p:nvSpPr>
+          <p:cNvPr id="14" name="Content Placeholder 13"/>
+          <p:cNvSpPr>
+            <a:spLocks noGrp="1"/>
+          </p:cNvSpPr>
+          <p:nvPr>
+            <p:ph idx="1"/>
+          </p:nvPr>
+        </p:nvSpPr>
+        <p:spPr/>
+        <p:txBody>
+          <a:bodyPr>
+            <a:normAutofit/>
+          </a:bodyPr>
+          <a:lstStyle/>
+          <a:p>
+            <a:r>
+              <a:rPr lang="en-US" dirty="0"/>
+              <a:t>Java</a:t>
+            </a:r>
+          </a:p>
+          <a:p>
+            <a:pPr lvl="1"/>
+            <a:r>
+              <a:rPr lang="en-US" dirty="0"/>
+              <a:t>PIT - </a:t>
+            </a:r>
+            <a:r>
+              <a:rPr lang="en-US" dirty="0">
+                <a:hlinkClick r:id="rId3"/>
+              </a:rPr>
+              <a:t>http://pitest.org/</a:t>
+            </a:r>
+            <a:endParaRPr lang="en-US" dirty="0"/>
+          </a:p>
+          <a:p>
+            <a:pPr lvl="1"/>
+            <a:r>
+              <a:rPr lang="en-US" dirty="0"/>
+              <a:t>Major mutation framework - </a:t>
+            </a:r>
+            <a:r>
+              <a:rPr lang="en-US" dirty="0">
+                <a:hlinkClick r:id="rId4"/>
+              </a:rPr>
+              <a:t>http://mutation-testing.org/</a:t>
+            </a:r>
+            <a:r>
+              <a:rPr lang="en-US" dirty="0"/>
+              <a:t> </a:t>
+            </a:r>
+          </a:p>
+          <a:p>
+            <a:r>
+              <a:rPr lang="en-US" dirty="0"/>
+              <a:t>C#</a:t>
+            </a:r>
+          </a:p>
+          <a:p>
+            <a:pPr lvl="1"/>
+            <a:r>
+              <a:rPr lang="en-US" dirty="0" err="1"/>
+              <a:t>VisualMutator</a:t>
+            </a:r>
+            <a:r>
+              <a:rPr lang="en-US" dirty="0"/>
+              <a:t> - </a:t>
+            </a:r>
+            <a:r>
+              <a:rPr lang="en-US" dirty="0">
+                <a:hlinkClick r:id="rId5"/>
+              </a:rPr>
+              <a:t>http://visualmutator.github.io/web/</a:t>
+            </a:r>
+            <a:r>
+              <a:rPr lang="en-US" dirty="0"/>
+              <a:t> </a:t>
+            </a:r>
+          </a:p>
+          <a:p>
+            <a:pPr lvl="1"/>
+            <a:r>
+              <a:rPr lang="en-US" dirty="0" err="1"/>
+              <a:t>NinjaTurtles</a:t>
+            </a:r>
+            <a:r>
+              <a:rPr lang="en-US" dirty="0"/>
+              <a:t> - </a:t>
+            </a:r>
+            <a:r>
+              <a:rPr lang="en-US" dirty="0">
+                <a:hlinkClick r:id="rId6"/>
+              </a:rPr>
+              <a:t>http://www.mutation-testing.net/</a:t>
+            </a:r>
+            <a:r>
+              <a:rPr lang="en-US" dirty="0"/>
+              <a:t> </a:t>
+            </a:r>
+            <a:r>
+              <a:rPr lang="en-US" sz="2400" dirty="0"/>
+              <a:t>(orphaned)</a:t>
+            </a:r>
+          </a:p>
+          <a:p>
+            <a:r>
+              <a:rPr lang="en-US" dirty="0"/>
+              <a:t>JavaScript / TypeScript</a:t>
+            </a:r>
+          </a:p>
+          <a:p>
+            <a:pPr lvl="1"/>
+            <a:r>
+              <a:rPr lang="en-US" dirty="0"/>
+              <a:t>Stryker - </a:t>
+            </a:r>
+            <a:r>
+              <a:rPr lang="en-US" dirty="0">
+                <a:hlinkClick r:id="rId7"/>
+              </a:rPr>
+              <a:t>https://stryker-mutator.io/</a:t>
+            </a:r>
+            <a:r>
+              <a:rPr lang="en-US" dirty="0"/>
+              <a:t> (C# &amp; Scala)</a:t>
+            </a:r>
+          </a:p>
+        </p:txBody>
+      </p:sp>
+    </p:spTree>
+    <p:extLst>
+      <p:ext uri="{BB962C8B-B14F-4D97-AF65-F5344CB8AC3E}">
+        <p14:creationId xmlns:p14="http://schemas.microsoft.com/office/powerpoint/2010/main" val="1019865085"/>
+      </p:ext>
+    </p:extLst>
+  </p:cSld>
+  <p:clrMapOvr>
+    <a:masterClrMapping/>
+  </p:clrMapOvr>
+  <mc:AlternateContent xmlns:mc="http://schemas.openxmlformats.org/markup-compatibility/2006" xmlns:p14="http://schemas.microsoft.com/office/powerpoint/2010/main">
+    <mc:Choice Requires="p14">
+      <p:transition p14:dur="0"/>
+    </mc:Choice>
+    <mc:Fallback xmlns="">
+      <p:transition/>
+    </mc:Fallback>
+  </mc:AlternateContent>
+  <p:timing>
+    <p:tnLst>
+      <p:par>
+        <p:cTn id="1" dur="indefinite" restart="never" nodeType="tmRoot">
+          <p:childTnLst>
+            <p:seq concurrent="1" nextAc="seek">
+              <p:cTn id="2" dur="indefinite" nodeType="mainSeq">
+                <p:childTnLst>
+                  <p:par>
+                    <p:cTn id="3" fill="hold">
+                      <p:stCondLst>
+                        <p:cond delay="indefinite"/>
+                      </p:stCondLst>
+                      <p:childTnLst>
+                        <p:par>
+                          <p:cTn id="4" fill="hold">
+                            <p:stCondLst>
+                              <p:cond delay="0"/>
+                            </p:stCondLst>
+                            <p:childTnLst>
+                              <p:par>
+                                <p:cTn id="5" presetID="1" presetClass="entr" presetSubtype="0" fill="hold" grpId="0" nodeType="clickEffect">
+                                  <p:stCondLst>
+                                    <p:cond delay="0"/>
+                                  </p:stCondLst>
+                                  <p:childTnLst>
+                                    <p:set>
+                                      <p:cBhvr>
+                                        <p:cTn id="6" dur="1" fill="hold">
+                                          <p:stCondLst>
+                                            <p:cond delay="0"/>
+                                          </p:stCondLst>
+                                        </p:cTn>
+                                        <p:tgtEl>
+                                          <p:spTgt spid="14">
+                                            <p:txEl>
+                                              <p:pRg st="0" end="0"/>
+                                            </p:txEl>
+                                          </p:spTgt>
+                                        </p:tgtEl>
+                                        <p:attrNameLst>
+                                          <p:attrName>style.visibility</p:attrName>
+                                        </p:attrNameLst>
+                                      </p:cBhvr>
+                                      <p:to>
+                                        <p:strVal val="visible"/>
+                                      </p:to>
+                                    </p:set>
+                                  </p:childTnLst>
+                                </p:cTn>
+                              </p:par>
+                              <p:par>
+                                <p:cTn id="7" presetID="1" presetClass="entr" presetSubtype="0" fill="hold" grpId="0" nodeType="withEffect">
+                                  <p:stCondLst>
+                                    <p:cond delay="0"/>
+                                  </p:stCondLst>
+                                  <p:childTnLst>
+                                    <p:set>
+                                      <p:cBhvr>
+                                        <p:cTn id="8" dur="1" fill="hold">
+                                          <p:stCondLst>
+                                            <p:cond delay="0"/>
+                                          </p:stCondLst>
+                                        </p:cTn>
+                                        <p:tgtEl>
+                                          <p:spTgt spid="14">
+                                            <p:txEl>
+                                              <p:pRg st="1" end="1"/>
+                                            </p:txEl>
+                                          </p:spTgt>
+                                        </p:tgtEl>
+                                        <p:attrNameLst>
+                                          <p:attrName>style.visibility</p:attrName>
+                                        </p:attrNameLst>
+                                      </p:cBhvr>
+                                      <p:to>
+                                        <p:strVal val="visible"/>
+                                      </p:to>
+                                    </p:set>
+                                  </p:childTnLst>
+                                </p:cTn>
+                              </p:par>
+                              <p:par>
+                                <p:cTn id="9" presetID="1" presetClass="entr" presetSubtype="0" fill="hold" grpId="0" nodeType="withEffect">
+                                  <p:stCondLst>
+                                    <p:cond delay="0"/>
+                                  </p:stCondLst>
+                                  <p:childTnLst>
+                                    <p:set>
+                                      <p:cBhvr>
+                                        <p:cTn id="10" dur="1" fill="hold">
+                                          <p:stCondLst>
+                                            <p:cond delay="0"/>
+                                          </p:stCondLst>
+                                        </p:cTn>
+                                        <p:tgtEl>
+                                          <p:spTgt spid="14">
+                                            <p:txEl>
+                                              <p:pRg st="2" end="2"/>
+                                            </p:txEl>
+                                          </p:spTgt>
+                                        </p:tgtEl>
+                                        <p:attrNameLst>
+                                          <p:attrName>style.visibility</p:attrName>
+                                        </p:attrNameLst>
+                                      </p:cBhvr>
+                                      <p:to>
+                                        <p:strVal val="visible"/>
+                                      </p:to>
+                                    </p:set>
+                                  </p:childTnLst>
+                                </p:cTn>
+                              </p:par>
+                            </p:childTnLst>
+                          </p:cTn>
+                        </p:par>
+                      </p:childTnLst>
+                    </p:cTn>
+                  </p:par>
+                  <p:par>
+                    <p:cTn id="11" fill="hold">
+                      <p:stCondLst>
+                        <p:cond delay="indefinite"/>
+                      </p:stCondLst>
+                      <p:childTnLst>
+                        <p:par>
+                          <p:cTn id="12" fill="hold">
+                            <p:stCondLst>
+                              <p:cond delay="0"/>
+                            </p:stCondLst>
+                            <p:childTnLst>
+                              <p:par>
+                                <p:cTn id="13" presetID="1" presetClass="entr" presetSubtype="0" fill="hold" grpId="0" nodeType="clickEffect">
+                                  <p:stCondLst>
+                                    <p:cond delay="0"/>
+                                  </p:stCondLst>
+                                  <p:childTnLst>
+                                    <p:set>
+                                      <p:cBhvr>
+                                        <p:cTn id="14" dur="1" fill="hold">
+                                          <p:stCondLst>
+                                            <p:cond delay="0"/>
+                                          </p:stCondLst>
+                                        </p:cTn>
+                                        <p:tgtEl>
+                                          <p:spTgt spid="14">
+                                            <p:txEl>
+                                              <p:pRg st="3" end="3"/>
+                                            </p:txEl>
+                                          </p:spTgt>
+                                        </p:tgtEl>
+                                        <p:attrNameLst>
+                                          <p:attrName>style.visibility</p:attrName>
+                                        </p:attrNameLst>
+                                      </p:cBhvr>
+                                      <p:to>
+                                        <p:strVal val="visible"/>
+                                      </p:to>
+                                    </p:set>
+                                  </p:childTnLst>
+                                </p:cTn>
+                              </p:par>
+                              <p:par>
+                                <p:cTn id="15" presetID="1" presetClass="entr" presetSubtype="0" fill="hold" grpId="0" nodeType="withEffect">
+                                  <p:stCondLst>
+                                    <p:cond delay="0"/>
+                                  </p:stCondLst>
+                                  <p:childTnLst>
+                                    <p:set>
+                                      <p:cBhvr>
+                                        <p:cTn id="16" dur="1" fill="hold">
+                                          <p:stCondLst>
+                                            <p:cond delay="0"/>
+                                          </p:stCondLst>
+                                        </p:cTn>
+                                        <p:tgtEl>
+                                          <p:spTgt spid="14">
+                                            <p:txEl>
+                                              <p:pRg st="4" end="4"/>
+                                            </p:txEl>
+                                          </p:spTgt>
+                                        </p:tgtEl>
+                                        <p:attrNameLst>
+                                          <p:attrName>style.visibility</p:attrName>
+                                        </p:attrNameLst>
+                                      </p:cBhvr>
+                                      <p:to>
+                                        <p:strVal val="visible"/>
+                                      </p:to>
+                                    </p:set>
+                                  </p:childTnLst>
+                                </p:cTn>
+                              </p:par>
+                              <p:par>
+                                <p:cTn id="17" presetID="1" presetClass="entr" presetSubtype="0" fill="hold" grpId="0" nodeType="withEffect">
+                                  <p:stCondLst>
+                                    <p:cond delay="0"/>
+                                  </p:stCondLst>
+                                  <p:childTnLst>
+                                    <p:set>
+                                      <p:cBhvr>
+                                        <p:cTn id="18" dur="1" fill="hold">
+                                          <p:stCondLst>
+                                            <p:cond delay="0"/>
+                                          </p:stCondLst>
+                                        </p:cTn>
+                                        <p:tgtEl>
+                                          <p:spTgt spid="14">
+                                            <p:txEl>
+                                              <p:pRg st="5" end="5"/>
+                                            </p:txEl>
+                                          </p:spTgt>
+                                        </p:tgtEl>
+                                        <p:attrNameLst>
+                                          <p:attrName>style.visibility</p:attrName>
+                                        </p:attrNameLst>
+                                      </p:cBhvr>
+                                      <p:to>
+                                        <p:strVal val="visible"/>
+                                      </p:to>
+                                    </p:set>
+                                  </p:childTnLst>
+                                </p:cTn>
+                              </p:par>
+                            </p:childTnLst>
+                          </p:cTn>
+                        </p:par>
+                      </p:childTnLst>
+                    </p:cTn>
+                  </p:par>
+                  <p:par>
+                    <p:cTn id="19" fill="hold">
+                      <p:stCondLst>
+                        <p:cond delay="indefinite"/>
+                      </p:stCondLst>
+                      <p:childTnLst>
+                        <p:par>
+                          <p:cTn id="20" fill="hold">
+                            <p:stCondLst>
+                              <p:cond delay="0"/>
+                            </p:stCondLst>
+                            <p:childTnLst>
+                              <p:par>
+                                <p:cTn id="21" presetID="1" presetClass="entr" presetSubtype="0" fill="hold" grpId="0" nodeType="clickEffect">
+                                  <p:stCondLst>
+                                    <p:cond delay="0"/>
+                                  </p:stCondLst>
+                                  <p:childTnLst>
+                                    <p:set>
+                                      <p:cBhvr>
+                                        <p:cTn id="22" dur="1" fill="hold">
+                                          <p:stCondLst>
+                                            <p:cond delay="0"/>
+                                          </p:stCondLst>
+                                        </p:cTn>
+                                        <p:tgtEl>
+                                          <p:spTgt spid="14">
+                                            <p:txEl>
+                                              <p:pRg st="6" end="6"/>
+                                            </p:txEl>
+                                          </p:spTgt>
+                                        </p:tgtEl>
+                                        <p:attrNameLst>
+                                          <p:attrName>style.visibility</p:attrName>
+                                        </p:attrNameLst>
+                                      </p:cBhvr>
+                                      <p:to>
+                                        <p:strVal val="visible"/>
+                                      </p:to>
+                                    </p:set>
+                                  </p:childTnLst>
+                                </p:cTn>
+                              </p:par>
+                              <p:par>
+                                <p:cTn id="23" presetID="1" presetClass="entr" presetSubtype="0" fill="hold" grpId="0" nodeType="withEffect">
+                                  <p:stCondLst>
+                                    <p:cond delay="0"/>
+                                  </p:stCondLst>
+                                  <p:childTnLst>
+                                    <p:set>
+                                      <p:cBhvr>
+                                        <p:cTn id="24" dur="1" fill="hold">
+                                          <p:stCondLst>
+                                            <p:cond delay="0"/>
+                                          </p:stCondLst>
+                                        </p:cTn>
+                                        <p:tgtEl>
+                                          <p:spTgt spid="14">
+                                            <p:txEl>
+                                              <p:pRg st="7" end="7"/>
+                                            </p:txEl>
+                                          </p:spTgt>
+                                        </p:tgtEl>
+                                        <p:attrNameLst>
+                                          <p:attrName>style.visibility</p:attrName>
+                                        </p:attrNameLst>
+                                      </p:cBhvr>
+                                      <p:to>
+                                        <p:strVal val="visible"/>
+                                      </p:to>
+                                    </p:set>
+                                  </p:childTnLst>
+                                </p:cTn>
+                              </p:par>
+                            </p:childTnLst>
+                          </p:cTn>
+                        </p:par>
+                      </p:childTnLst>
+                    </p:cTn>
+                  </p:par>
+                </p:childTnLst>
+              </p:cTn>
+              <p:prevCondLst>
+                <p:cond evt="onPrev" delay="0">
+                  <p:tgtEl>
+                    <p:sldTgt/>
+                  </p:tgtEl>
+                </p:cond>
+              </p:prevCondLst>
+              <p:nextCondLst>
+                <p:cond evt="onNext" delay="0">
+                  <p:tgtEl>
+                    <p:sldTgt/>
+                  </p:tgtEl>
+                </p:cond>
+              </p:nextCondLst>
+            </p:seq>
+          </p:childTnLst>
+        </p:cTn>
+      </p:par>
+    </p:tnLst>
+    <p:bldLst>
+      <p:bldP spid="14" grpId="0" uiExpand="1" build="p"/>
+    </p:bldLst>
+  </p:timing>
+</p:sld>
+</file>
+
+<file path=ppt/slides/slide11.xml><?xml version="1.0" encoding="utf-8"?>
+<p:sld xmlns:a="http://schemas.openxmlformats.org/drawingml/2006/main" xmlns:r="http://schemas.openxmlformats.org/officeDocument/2006/relationships" xmlns:p="http://schemas.openxmlformats.org/presentationml/2006/main">
+  <p:cSld>
+    <p:spTree>
+      <p:nvGrpSpPr>
+        <p:cNvPr id="1" name=""/>
+        <p:cNvGrpSpPr/>
+        <p:nvPr/>
+      </p:nvGrpSpPr>
+      <p:grpSpPr>
+        <a:xfrm>
+          <a:off x="0" y="0"/>
+          <a:ext cx="0" cy="0"/>
+          <a:chOff x="0" y="0"/>
+          <a:chExt cx="0" cy="0"/>
+        </a:xfrm>
+      </p:grpSpPr>
+      <p:sp>
+        <p:nvSpPr>
+          <p:cNvPr id="2" name="Title 1">
+            <a:extLst>
+              <a:ext uri="{FF2B5EF4-FFF2-40B4-BE49-F238E27FC236}">
+                <a16:creationId xmlns:a16="http://schemas.microsoft.com/office/drawing/2014/main" id="{4DBA19CA-F161-4303-BC72-5FA16C1E63FF}"/>
+              </a:ext>
+            </a:extLst>
+          </p:cNvPr>
+          <p:cNvSpPr>
+            <a:spLocks noGrp="1"/>
+          </p:cNvSpPr>
+          <p:nvPr>
+            <p:ph type="ctrTitle"/>
+          </p:nvPr>
+        </p:nvSpPr>
+        <p:spPr/>
+        <p:txBody>
+          <a:bodyPr/>
+          <a:lstStyle/>
+          <a:p>
+            <a:r>
+              <a:rPr lang="en-US" dirty="0"/>
+              <a:t>Mutation Testing Tool Example</a:t>
+            </a:r>
+          </a:p>
+        </p:txBody>
+      </p:sp>
+      <p:sp>
+        <p:nvSpPr>
+          <p:cNvPr id="4" name="Subtitle 3">
+            <a:extLst>
+              <a:ext uri="{FF2B5EF4-FFF2-40B4-BE49-F238E27FC236}">
+                <a16:creationId xmlns:a16="http://schemas.microsoft.com/office/drawing/2014/main" id="{8CA0D2D4-009B-421B-86DF-F79A0354C1AB}"/>
+              </a:ext>
+            </a:extLst>
+          </p:cNvPr>
+          <p:cNvSpPr>
+            <a:spLocks noGrp="1"/>
+          </p:cNvSpPr>
+          <p:nvPr>
+            <p:ph type="subTitle" idx="1"/>
+          </p:nvPr>
+        </p:nvSpPr>
+        <p:spPr/>
+        <p:txBody>
+          <a:bodyPr/>
+          <a:lstStyle/>
+          <a:p>
+            <a:endParaRPr lang="en-US"/>
+          </a:p>
+        </p:txBody>
+      </p:sp>
+    </p:spTree>
+    <p:extLst>
+      <p:ext uri="{BB962C8B-B14F-4D97-AF65-F5344CB8AC3E}">
+        <p14:creationId xmlns:p14="http://schemas.microsoft.com/office/powerpoint/2010/main" val="2171408198"/>
+      </p:ext>
+    </p:extLst>
+  </p:cSld>
+  <p:clrMapOvr>
+    <a:masterClrMapping/>
+  </p:clrMapOvr>
+  <mc:AlternateContent xmlns:mc="http://schemas.openxmlformats.org/markup-compatibility/2006" xmlns:p14="http://schemas.microsoft.com/office/powerpoint/2010/main">
+    <mc:Choice Requires="p14">
+      <p:transition p14:dur="0"/>
+    </mc:Choice>
+    <mc:Fallback xmlns="">
+      <p:transition/>
+    </mc:Fallback>
+  </mc:AlternateContent>
+</p:sld>
+</file>
+
+<file path=ppt/slides/slide12.xml><?xml version="1.0" encoding="utf-8"?>
+<p:sld xmlns:a="http://schemas.openxmlformats.org/drawingml/2006/main" xmlns:r="http://schemas.openxmlformats.org/officeDocument/2006/relationships" xmlns:p="http://schemas.openxmlformats.org/presentationml/2006/main">
+  <p:cSld>
+    <p:spTree>
+      <p:nvGrpSpPr>
+        <p:cNvPr id="1" name=""/>
+        <p:cNvGrpSpPr/>
+        <p:nvPr/>
+      </p:nvGrpSpPr>
+      <p:grpSpPr>
+        <a:xfrm>
+          <a:off x="0" y="0"/>
+          <a:ext cx="0" cy="0"/>
+          <a:chOff x="0" y="0"/>
+          <a:chExt cx="0" cy="0"/>
+        </a:xfrm>
+      </p:grpSpPr>
+      <p:sp>
+        <p:nvSpPr>
           <p:cNvPr id="2" name="Title 1">
             <a:extLst>
               <a:ext uri="{FF2B5EF4-FFF2-40B4-BE49-F238E27FC236}">
@@ -9395,7 +10013,7 @@
 </p:sld>
 </file>
 
-<file path=ppt/slides/slide11.xml><?xml version="1.0" encoding="utf-8"?>
+<file path=ppt/slides/slide13.xml><?xml version="1.0" encoding="utf-8"?>
 <p:sld xmlns:a="http://schemas.openxmlformats.org/drawingml/2006/main" xmlns:r="http://schemas.openxmlformats.org/officeDocument/2006/relationships" xmlns:p="http://schemas.openxmlformats.org/presentationml/2006/main">
   <p:cSld>
     <p:spTree>
@@ -9888,7 +10506,7 @@
 </p:sld>
 </file>
 
-<file path=ppt/slides/slide12.xml><?xml version="1.0" encoding="utf-8"?>
+<file path=ppt/slides/slide14.xml><?xml version="1.0" encoding="utf-8"?>
 <p:sld xmlns:a="http://schemas.openxmlformats.org/drawingml/2006/main" xmlns:r="http://schemas.openxmlformats.org/officeDocument/2006/relationships" xmlns:p="http://schemas.openxmlformats.org/presentationml/2006/main">
   <p:cSld>
     <p:spTree>
@@ -9982,7 +10600,7 @@
 </p:sld>
 </file>
 
-<file path=ppt/slides/slide13.xml><?xml version="1.0" encoding="utf-8"?>
+<file path=ppt/slides/slide15.xml><?xml version="1.0" encoding="utf-8"?>
 <p:sld xmlns:a="http://schemas.openxmlformats.org/drawingml/2006/main" xmlns:r="http://schemas.openxmlformats.org/officeDocument/2006/relationships" xmlns:p="http://schemas.openxmlformats.org/presentationml/2006/main">
   <p:cSld>
     <p:spTree>
@@ -10206,7 +10824,7 @@
 </p:sld>
 </file>
 
-<file path=ppt/slides/slide14.xml><?xml version="1.0" encoding="utf-8"?>
+<file path=ppt/slides/slide16.xml><?xml version="1.0" encoding="utf-8"?>
 <p:sld xmlns:a="http://schemas.openxmlformats.org/drawingml/2006/main" xmlns:r="http://schemas.openxmlformats.org/officeDocument/2006/relationships" xmlns:p="http://schemas.openxmlformats.org/presentationml/2006/main">
   <p:cSld>
     <p:spTree>
@@ -10541,7 +11159,7 @@
 </p:sld>
 </file>
 
-<file path=ppt/slides/slide15.xml><?xml version="1.0" encoding="utf-8"?>
+<file path=ppt/slides/slide17.xml><?xml version="1.0" encoding="utf-8"?>
 <p:sld xmlns:a="http://schemas.openxmlformats.org/drawingml/2006/main" xmlns:r="http://schemas.openxmlformats.org/officeDocument/2006/relationships" xmlns:p="http://schemas.openxmlformats.org/presentationml/2006/main">
   <p:cSld>
     <p:spTree>
@@ -10763,7 +11381,7 @@
 </p:sld>
 </file>
 
-<file path=ppt/slides/slide16.xml><?xml version="1.0" encoding="utf-8"?>
+<file path=ppt/slides/slide18.xml><?xml version="1.0" encoding="utf-8"?>
 <p:sld xmlns:a="http://schemas.openxmlformats.org/drawingml/2006/main" xmlns:r="http://schemas.openxmlformats.org/officeDocument/2006/relationships" xmlns:p="http://schemas.openxmlformats.org/presentationml/2006/main">
   <p:cSld>
     <p:spTree>
@@ -11211,7 +11829,7 @@
 </p:sld>
 </file>
 
-<file path=ppt/slides/slide17.xml><?xml version="1.0" encoding="utf-8"?>
+<file path=ppt/slides/slide19.xml><?xml version="1.0" encoding="utf-8"?>
 <p:sld xmlns:a="http://schemas.openxmlformats.org/drawingml/2006/main" xmlns:r="http://schemas.openxmlformats.org/officeDocument/2006/relationships" xmlns:p="http://schemas.openxmlformats.org/presentationml/2006/main">
   <p:cSld>
     <p:spTree>
@@ -11493,7 +12111,92 @@
 </p:sld>
 </file>
 
-<file path=ppt/slides/slide18.xml><?xml version="1.0" encoding="utf-8"?>
+<file path=ppt/slides/slide2.xml><?xml version="1.0" encoding="utf-8"?>
+<p:sld xmlns:a="http://schemas.openxmlformats.org/drawingml/2006/main" xmlns:r="http://schemas.openxmlformats.org/officeDocument/2006/relationships" xmlns:p="http://schemas.openxmlformats.org/presentationml/2006/main">
+  <p:cSld>
+    <p:spTree>
+      <p:nvGrpSpPr>
+        <p:cNvPr id="1" name=""/>
+        <p:cNvGrpSpPr/>
+        <p:nvPr/>
+      </p:nvGrpSpPr>
+      <p:grpSpPr>
+        <a:xfrm>
+          <a:off x="0" y="0"/>
+          <a:ext cx="0" cy="0"/>
+          <a:chOff x="0" y="0"/>
+          <a:chExt cx="0" cy="0"/>
+        </a:xfrm>
+      </p:grpSpPr>
+      <p:pic>
+        <p:nvPicPr>
+          <p:cNvPr id="1026" name="Picture 2">
+            <a:extLst>
+              <a:ext uri="{FF2B5EF4-FFF2-40B4-BE49-F238E27FC236}">
+                <a16:creationId xmlns:a16="http://schemas.microsoft.com/office/drawing/2014/main" id="{ECEA4883-DE2F-149D-8DD9-EBC7F0959F6F}"/>
+              </a:ext>
+            </a:extLst>
+          </p:cNvPr>
+          <p:cNvPicPr>
+            <a:picLocks noChangeAspect="1" noChangeArrowheads="1"/>
+          </p:cNvPicPr>
+          <p:nvPr/>
+        </p:nvPicPr>
+        <p:blipFill>
+          <a:blip r:embed="rId2">
+            <a:extLst>
+              <a:ext uri="{28A0092B-C50C-407E-A947-70E740481C1C}">
+                <a14:useLocalDpi xmlns:a14="http://schemas.microsoft.com/office/drawing/2010/main" val="0"/>
+              </a:ext>
+            </a:extLst>
+          </a:blip>
+          <a:srcRect/>
+          <a:stretch>
+            <a:fillRect/>
+          </a:stretch>
+        </p:blipFill>
+        <p:spPr bwMode="auto">
+          <a:xfrm>
+            <a:off x="0" y="0"/>
+            <a:ext cx="12192000" cy="6858000"/>
+          </a:xfrm>
+          <a:prstGeom prst="rect">
+            <a:avLst/>
+          </a:prstGeom>
+          <a:noFill/>
+          <a:extLst>
+            <a:ext uri="{909E8E84-426E-40DD-AFC4-6F175D3DCCD1}">
+              <a14:hiddenFill xmlns:a14="http://schemas.microsoft.com/office/drawing/2010/main">
+                <a:solidFill>
+                  <a:srgbClr val="FFFFFF"/>
+                </a:solidFill>
+              </a14:hiddenFill>
+            </a:ext>
+          </a:extLst>
+        </p:spPr>
+      </p:pic>
+    </p:spTree>
+    <p:extLst>
+      <p:ext uri="{BB962C8B-B14F-4D97-AF65-F5344CB8AC3E}">
+        <p14:creationId xmlns:p14="http://schemas.microsoft.com/office/powerpoint/2010/main" val="527408110"/>
+      </p:ext>
+    </p:extLst>
+  </p:cSld>
+  <p:clrMapOvr>
+    <a:masterClrMapping/>
+  </p:clrMapOvr>
+  <mc:AlternateContent xmlns:mc="http://schemas.openxmlformats.org/markup-compatibility/2006">
+    <mc:Choice xmlns:p14="http://schemas.microsoft.com/office/powerpoint/2010/main" Requires="p14">
+      <p:transition p14:dur="0"/>
+    </mc:Choice>
+    <mc:Fallback>
+      <p:transition/>
+    </mc:Fallback>
+  </mc:AlternateContent>
+</p:sld>
+</file>
+
+<file path=ppt/slides/slide20.xml><?xml version="1.0" encoding="utf-8"?>
 <p:sld xmlns:a="http://schemas.openxmlformats.org/drawingml/2006/main" xmlns:r="http://schemas.openxmlformats.org/officeDocument/2006/relationships" xmlns:p="http://schemas.openxmlformats.org/presentationml/2006/main">
   <p:cSld>
     <p:spTree>
@@ -11767,7 +12470,7 @@
 </p:sld>
 </file>
 
-<file path=ppt/slides/slide19.xml><?xml version="1.0" encoding="utf-8"?>
+<file path=ppt/slides/slide21.xml><?xml version="1.0" encoding="utf-8"?>
 <p:sld xmlns:a="http://schemas.openxmlformats.org/drawingml/2006/main" xmlns:r="http://schemas.openxmlformats.org/officeDocument/2006/relationships" xmlns:p="http://schemas.openxmlformats.org/presentationml/2006/main">
   <p:cSld>
     <p:spTree>
@@ -11903,7 +12606,383 @@
 </p:sld>
 </file>
 
-<file path=ppt/slides/slide2.xml><?xml version="1.0" encoding="utf-8"?>
+<file path=ppt/slides/slide22.xml><?xml version="1.0" encoding="utf-8"?>
+<p:sld xmlns:a="http://schemas.openxmlformats.org/drawingml/2006/main" xmlns:r="http://schemas.openxmlformats.org/officeDocument/2006/relationships" xmlns:p="http://schemas.openxmlformats.org/presentationml/2006/main">
+  <p:cSld>
+    <p:spTree>
+      <p:nvGrpSpPr>
+        <p:cNvPr id="1" name=""/>
+        <p:cNvGrpSpPr/>
+        <p:nvPr/>
+      </p:nvGrpSpPr>
+      <p:grpSpPr>
+        <a:xfrm>
+          <a:off x="0" y="0"/>
+          <a:ext cx="0" cy="0"/>
+          <a:chOff x="0" y="0"/>
+          <a:chExt cx="0" cy="0"/>
+        </a:xfrm>
+      </p:grpSpPr>
+      <p:sp>
+        <p:nvSpPr>
+          <p:cNvPr id="13" name="Title 12"/>
+          <p:cNvSpPr>
+            <a:spLocks noGrp="1"/>
+          </p:cNvSpPr>
+          <p:nvPr>
+            <p:ph type="title"/>
+          </p:nvPr>
+        </p:nvSpPr>
+        <p:spPr/>
+        <p:txBody>
+          <a:bodyPr/>
+          <a:lstStyle/>
+          <a:p>
+            <a:r>
+              <a:rPr lang="en-US" dirty="0"/>
+              <a:t>Code Samples &amp; Examples</a:t>
+            </a:r>
+          </a:p>
+        </p:txBody>
+      </p:sp>
+      <p:sp>
+        <p:nvSpPr>
+          <p:cNvPr id="14" name="Content Placeholder 13"/>
+          <p:cNvSpPr>
+            <a:spLocks noGrp="1"/>
+          </p:cNvSpPr>
+          <p:nvPr>
+            <p:ph idx="1"/>
+          </p:nvPr>
+        </p:nvSpPr>
+        <p:spPr/>
+        <p:txBody>
+          <a:bodyPr>
+            <a:normAutofit/>
+          </a:bodyPr>
+          <a:lstStyle/>
+          <a:p>
+            <a:r>
+              <a:rPr lang="en-US" u="sng" dirty="0">
+                <a:hlinkClick r:id="rId3"/>
+              </a:rPr>
+              <a:t>http://bit.ly/devup2022</a:t>
+            </a:r>
+            <a:br>
+              <a:rPr lang="en-US" u="sng" dirty="0"/>
+            </a:br>
+            <a:br>
+              <a:rPr lang="en-US" u="sng" dirty="0"/>
+            </a:br>
+            <a:r>
+              <a:rPr lang="en-US" dirty="0"/>
+              <a:t>(</a:t>
+            </a:r>
+            <a:r>
+              <a:rPr lang="en-US" u="sng" dirty="0">
+                <a:hlinkClick r:id="rId4"/>
+              </a:rPr>
+              <a:t>https://github.com/MHeironimus/devup-2022</a:t>
+            </a:r>
+            <a:r>
+              <a:rPr lang="en-US" dirty="0"/>
+              <a:t>)</a:t>
+            </a:r>
+          </a:p>
+        </p:txBody>
+      </p:sp>
+    </p:spTree>
+    <p:extLst>
+      <p:ext uri="{BB962C8B-B14F-4D97-AF65-F5344CB8AC3E}">
+        <p14:creationId xmlns:p14="http://schemas.microsoft.com/office/powerpoint/2010/main" val="1116147978"/>
+      </p:ext>
+    </p:extLst>
+  </p:cSld>
+  <p:clrMapOvr>
+    <a:masterClrMapping/>
+  </p:clrMapOvr>
+  <mc:AlternateContent xmlns:mc="http://schemas.openxmlformats.org/markup-compatibility/2006" xmlns:p14="http://schemas.microsoft.com/office/powerpoint/2010/main">
+    <mc:Choice Requires="p14">
+      <p:transition p14:dur="0"/>
+    </mc:Choice>
+    <mc:Fallback xmlns="">
+      <p:transition/>
+    </mc:Fallback>
+  </mc:AlternateContent>
+</p:sld>
+</file>
+
+<file path=ppt/slides/slide23.xml><?xml version="1.0" encoding="utf-8"?>
+<p:sld xmlns:a="http://schemas.openxmlformats.org/drawingml/2006/main" xmlns:r="http://schemas.openxmlformats.org/officeDocument/2006/relationships" xmlns:p="http://schemas.openxmlformats.org/presentationml/2006/main">
+  <p:cSld>
+    <p:spTree>
+      <p:nvGrpSpPr>
+        <p:cNvPr id="1" name=""/>
+        <p:cNvGrpSpPr/>
+        <p:nvPr/>
+      </p:nvGrpSpPr>
+      <p:grpSpPr>
+        <a:xfrm>
+          <a:off x="0" y="0"/>
+          <a:ext cx="0" cy="0"/>
+          <a:chOff x="0" y="0"/>
+          <a:chExt cx="0" cy="0"/>
+        </a:xfrm>
+      </p:grpSpPr>
+      <p:sp>
+        <p:nvSpPr>
+          <p:cNvPr id="2" name="Title 1">
+            <a:extLst>
+              <a:ext uri="{FF2B5EF4-FFF2-40B4-BE49-F238E27FC236}">
+                <a16:creationId xmlns:a16="http://schemas.microsoft.com/office/drawing/2014/main" id="{4DBA19CA-F161-4303-BC72-5FA16C1E63FF}"/>
+              </a:ext>
+            </a:extLst>
+          </p:cNvPr>
+          <p:cNvSpPr>
+            <a:spLocks noGrp="1"/>
+          </p:cNvSpPr>
+          <p:nvPr>
+            <p:ph type="ctrTitle"/>
+          </p:nvPr>
+        </p:nvSpPr>
+        <p:spPr/>
+        <p:txBody>
+          <a:bodyPr/>
+          <a:lstStyle/>
+          <a:p>
+            <a:r>
+              <a:rPr lang="en-US" dirty="0"/>
+              <a:t>Questions?</a:t>
+            </a:r>
+          </a:p>
+        </p:txBody>
+      </p:sp>
+      <p:sp>
+        <p:nvSpPr>
+          <p:cNvPr id="4" name="Subtitle 3">
+            <a:extLst>
+              <a:ext uri="{FF2B5EF4-FFF2-40B4-BE49-F238E27FC236}">
+                <a16:creationId xmlns:a16="http://schemas.microsoft.com/office/drawing/2014/main" id="{8CA0D2D4-009B-421B-86DF-F79A0354C1AB}"/>
+              </a:ext>
+            </a:extLst>
+          </p:cNvPr>
+          <p:cNvSpPr>
+            <a:spLocks noGrp="1"/>
+          </p:cNvSpPr>
+          <p:nvPr>
+            <p:ph type="subTitle" idx="1"/>
+          </p:nvPr>
+        </p:nvSpPr>
+        <p:spPr/>
+        <p:txBody>
+          <a:bodyPr/>
+          <a:lstStyle/>
+          <a:p>
+            <a:endParaRPr lang="en-US"/>
+          </a:p>
+        </p:txBody>
+      </p:sp>
+    </p:spTree>
+    <p:extLst>
+      <p:ext uri="{BB962C8B-B14F-4D97-AF65-F5344CB8AC3E}">
+        <p14:creationId xmlns:p14="http://schemas.microsoft.com/office/powerpoint/2010/main" val="1426011100"/>
+      </p:ext>
+    </p:extLst>
+  </p:cSld>
+  <p:clrMapOvr>
+    <a:masterClrMapping/>
+  </p:clrMapOvr>
+  <mc:AlternateContent xmlns:mc="http://schemas.openxmlformats.org/markup-compatibility/2006" xmlns:p14="http://schemas.microsoft.com/office/powerpoint/2010/main">
+    <mc:Choice Requires="p14">
+      <p:transition p14:dur="0"/>
+    </mc:Choice>
+    <mc:Fallback xmlns="">
+      <p:transition/>
+    </mc:Fallback>
+  </mc:AlternateContent>
+</p:sld>
+</file>
+
+<file path=ppt/slides/slide24.xml><?xml version="1.0" encoding="utf-8"?>
+<p:sld xmlns:a="http://schemas.openxmlformats.org/drawingml/2006/main" xmlns:r="http://schemas.openxmlformats.org/officeDocument/2006/relationships" xmlns:p="http://schemas.openxmlformats.org/presentationml/2006/main">
+  <p:cSld>
+    <p:spTree>
+      <p:nvGrpSpPr>
+        <p:cNvPr id="1" name=""/>
+        <p:cNvGrpSpPr/>
+        <p:nvPr/>
+      </p:nvGrpSpPr>
+      <p:grpSpPr>
+        <a:xfrm>
+          <a:off x="0" y="0"/>
+          <a:ext cx="0" cy="0"/>
+          <a:chOff x="0" y="0"/>
+          <a:chExt cx="0" cy="0"/>
+        </a:xfrm>
+      </p:grpSpPr>
+      <p:sp>
+        <p:nvSpPr>
+          <p:cNvPr id="13" name="Title 12"/>
+          <p:cNvSpPr>
+            <a:spLocks noGrp="1"/>
+          </p:cNvSpPr>
+          <p:nvPr>
+            <p:ph type="title"/>
+          </p:nvPr>
+        </p:nvSpPr>
+        <p:spPr/>
+        <p:txBody>
+          <a:bodyPr/>
+          <a:lstStyle/>
+          <a:p>
+            <a:r>
+              <a:rPr lang="en-US" dirty="0"/>
+              <a:t>Advanced Topics</a:t>
+            </a:r>
+          </a:p>
+        </p:txBody>
+      </p:sp>
+      <p:sp>
+        <p:nvSpPr>
+          <p:cNvPr id="14" name="Content Placeholder 13"/>
+          <p:cNvSpPr>
+            <a:spLocks noGrp="1"/>
+          </p:cNvSpPr>
+          <p:nvPr>
+            <p:ph idx="1"/>
+          </p:nvPr>
+        </p:nvSpPr>
+        <p:spPr/>
+        <p:txBody>
+          <a:bodyPr/>
+          <a:lstStyle/>
+          <a:p>
+            <a:r>
+              <a:rPr lang="en-US" dirty="0"/>
+              <a:t>Mutations &amp; Test Timeouts</a:t>
+            </a:r>
+          </a:p>
+          <a:p>
+            <a:r>
+              <a:rPr lang="en-US" dirty="0"/>
+              <a:t>Other Mutation Types</a:t>
+            </a:r>
+          </a:p>
+          <a:p>
+            <a:r>
+              <a:rPr lang="en-US" dirty="0"/>
+              <a:t>Writing Custom Mutations</a:t>
+            </a:r>
+          </a:p>
+        </p:txBody>
+      </p:sp>
+    </p:spTree>
+    <p:extLst>
+      <p:ext uri="{BB962C8B-B14F-4D97-AF65-F5344CB8AC3E}">
+        <p14:creationId xmlns:p14="http://schemas.microsoft.com/office/powerpoint/2010/main" val="864206668"/>
+      </p:ext>
+    </p:extLst>
+  </p:cSld>
+  <p:clrMapOvr>
+    <a:masterClrMapping/>
+  </p:clrMapOvr>
+  <mc:AlternateContent xmlns:mc="http://schemas.openxmlformats.org/markup-compatibility/2006" xmlns:p14="http://schemas.microsoft.com/office/powerpoint/2010/main">
+    <mc:Choice Requires="p14">
+      <p:transition p14:dur="0"/>
+    </mc:Choice>
+    <mc:Fallback xmlns="">
+      <p:transition/>
+    </mc:Fallback>
+  </mc:AlternateContent>
+</p:sld>
+</file>
+
+<file path=ppt/slides/slide3.xml><?xml version="1.0" encoding="utf-8"?>
+<p:sld xmlns:a="http://schemas.openxmlformats.org/drawingml/2006/main" xmlns:r="http://schemas.openxmlformats.org/officeDocument/2006/relationships" xmlns:p="http://schemas.openxmlformats.org/presentationml/2006/main">
+  <p:cSld>
+    <p:spTree>
+      <p:nvGrpSpPr>
+        <p:cNvPr id="1" name=""/>
+        <p:cNvGrpSpPr/>
+        <p:nvPr/>
+      </p:nvGrpSpPr>
+      <p:grpSpPr>
+        <a:xfrm>
+          <a:off x="0" y="0"/>
+          <a:ext cx="0" cy="0"/>
+          <a:chOff x="0" y="0"/>
+          <a:chExt cx="0" cy="0"/>
+        </a:xfrm>
+      </p:grpSpPr>
+      <p:pic>
+        <p:nvPicPr>
+          <p:cNvPr id="2050" name="Picture 2">
+            <a:extLst>
+              <a:ext uri="{FF2B5EF4-FFF2-40B4-BE49-F238E27FC236}">
+                <a16:creationId xmlns:a16="http://schemas.microsoft.com/office/drawing/2014/main" id="{D5938A20-F39C-EBF0-ECC1-A5F16147A56D}"/>
+              </a:ext>
+            </a:extLst>
+          </p:cNvPr>
+          <p:cNvPicPr>
+            <a:picLocks noChangeAspect="1" noChangeArrowheads="1"/>
+          </p:cNvPicPr>
+          <p:nvPr/>
+        </p:nvPicPr>
+        <p:blipFill>
+          <a:blip r:embed="rId2">
+            <a:extLst>
+              <a:ext uri="{28A0092B-C50C-407E-A947-70E740481C1C}">
+                <a14:useLocalDpi xmlns:a14="http://schemas.microsoft.com/office/drawing/2010/main" val="0"/>
+              </a:ext>
+            </a:extLst>
+          </a:blip>
+          <a:srcRect/>
+          <a:stretch>
+            <a:fillRect/>
+          </a:stretch>
+        </p:blipFill>
+        <p:spPr bwMode="auto">
+          <a:xfrm>
+            <a:off x="0" y="0"/>
+            <a:ext cx="12192000" cy="6858000"/>
+          </a:xfrm>
+          <a:prstGeom prst="rect">
+            <a:avLst/>
+          </a:prstGeom>
+          <a:noFill/>
+          <a:extLst>
+            <a:ext uri="{909E8E84-426E-40DD-AFC4-6F175D3DCCD1}">
+              <a14:hiddenFill xmlns:a14="http://schemas.microsoft.com/office/drawing/2010/main">
+                <a:solidFill>
+                  <a:srgbClr val="FFFFFF"/>
+                </a:solidFill>
+              </a14:hiddenFill>
+            </a:ext>
+          </a:extLst>
+        </p:spPr>
+      </p:pic>
+    </p:spTree>
+    <p:extLst>
+      <p:ext uri="{BB962C8B-B14F-4D97-AF65-F5344CB8AC3E}">
+        <p14:creationId xmlns:p14="http://schemas.microsoft.com/office/powerpoint/2010/main" val="206536713"/>
+      </p:ext>
+    </p:extLst>
+  </p:cSld>
+  <p:clrMapOvr>
+    <a:masterClrMapping/>
+  </p:clrMapOvr>
+  <mc:AlternateContent xmlns:mc="http://schemas.openxmlformats.org/markup-compatibility/2006">
+    <mc:Choice xmlns:p14="http://schemas.microsoft.com/office/powerpoint/2010/main" Requires="p14">
+      <p:transition p14:dur="0"/>
+    </mc:Choice>
+    <mc:Fallback>
+      <p:transition/>
+    </mc:Fallback>
+  </mc:AlternateContent>
+</p:sld>
+</file>
+
+<file path=ppt/slides/slide4.xml><?xml version="1.0" encoding="utf-8"?>
 <p:sld xmlns:a="http://schemas.openxmlformats.org/drawingml/2006/main" xmlns:r="http://schemas.openxmlformats.org/officeDocument/2006/relationships" xmlns:p="http://schemas.openxmlformats.org/presentationml/2006/main">
   <p:cSld>
     <p:spTree>
@@ -12187,7 +13266,7 @@
 </p:sld>
 </file>
 
-<file path=ppt/slides/slide20.xml><?xml version="1.0" encoding="utf-8"?>
+<file path=ppt/slides/slide5.xml><?xml version="1.0" encoding="utf-8"?>
 <p:sld xmlns:a="http://schemas.openxmlformats.org/drawingml/2006/main" xmlns:r="http://schemas.openxmlformats.org/officeDocument/2006/relationships" xmlns:p="http://schemas.openxmlformats.org/presentationml/2006/main">
   <p:cSld>
     <p:spTree>
@@ -12221,79 +13300,44 @@
           <a:p>
             <a:r>
               <a:rPr lang="en-US" dirty="0"/>
-              <a:t>Code Samples &amp; Examples</a:t>
-            </a:r>
-          </a:p>
-        </p:txBody>
-      </p:sp>
-      <p:sp>
-        <p:nvSpPr>
-          <p:cNvPr id="14" name="Content Placeholder 13"/>
-          <p:cNvSpPr>
-            <a:spLocks noGrp="1"/>
-          </p:cNvSpPr>
-          <p:nvPr>
-            <p:ph idx="1"/>
+              <a:t>Code Coverage Demo</a:t>
+            </a:r>
+          </a:p>
+        </p:txBody>
+      </p:sp>
+      <p:sp>
+        <p:nvSpPr>
+          <p:cNvPr id="2" name="Text Placeholder 1"/>
+          <p:cNvSpPr>
+            <a:spLocks noGrp="1"/>
+          </p:cNvSpPr>
+          <p:nvPr>
+            <p:ph type="body" sz="half" idx="2"/>
           </p:nvPr>
         </p:nvSpPr>
         <p:spPr/>
         <p:txBody>
-          <a:bodyPr>
-            <a:normAutofit/>
-          </a:bodyPr>
+          <a:bodyPr/>
           <a:lstStyle/>
           <a:p>
-            <a:r>
-              <a:rPr lang="en-US" u="sng" dirty="0">
-                <a:hlinkClick r:id="rId3"/>
-              </a:rPr>
-              <a:t>http://bit.ly/devup2022</a:t>
-            </a:r>
-            <a:br>
-              <a:rPr lang="en-US" u="sng" dirty="0"/>
-            </a:br>
-            <a:br>
-              <a:rPr lang="en-US" u="sng" dirty="0"/>
-            </a:br>
-            <a:r>
-              <a:rPr lang="en-US" dirty="0"/>
-              <a:t>(</a:t>
-            </a:r>
-            <a:r>
-              <a:rPr lang="en-US" u="sng" dirty="0">
-                <a:hlinkClick r:id="rId4"/>
-              </a:rPr>
-              <a:t>https://github.com/MHeironimus/devup-2022</a:t>
-            </a:r>
-            <a:r>
-              <a:rPr lang="en-US" dirty="0"/>
-              <a:t>)</a:t>
-            </a:r>
+            <a:endParaRPr lang="en-US"/>
           </a:p>
         </p:txBody>
       </p:sp>
     </p:spTree>
     <p:extLst>
       <p:ext uri="{BB962C8B-B14F-4D97-AF65-F5344CB8AC3E}">
-        <p14:creationId xmlns:p14="http://schemas.microsoft.com/office/powerpoint/2010/main" val="1116147978"/>
+        <p14:creationId xmlns:p14="http://schemas.microsoft.com/office/powerpoint/2010/main" val="4220195126"/>
       </p:ext>
     </p:extLst>
   </p:cSld>
   <p:clrMapOvr>
     <a:masterClrMapping/>
   </p:clrMapOvr>
-  <mc:AlternateContent xmlns:mc="http://schemas.openxmlformats.org/markup-compatibility/2006" xmlns:p14="http://schemas.microsoft.com/office/powerpoint/2010/main">
-    <mc:Choice Requires="p14">
-      <p:transition p14:dur="0"/>
-    </mc:Choice>
-    <mc:Fallback xmlns="">
-      <p:transition/>
-    </mc:Fallback>
-  </mc:AlternateContent>
 </p:sld>
 </file>
 
-<file path=ppt/slides/slide21.xml><?xml version="1.0" encoding="utf-8"?>
+<file path=ppt/slides/slide6.xml><?xml version="1.0" encoding="utf-8"?>
 <p:sld xmlns:a="http://schemas.openxmlformats.org/drawingml/2006/main" xmlns:r="http://schemas.openxmlformats.org/officeDocument/2006/relationships" xmlns:p="http://schemas.openxmlformats.org/presentationml/2006/main">
   <p:cSld>
     <p:spTree>
@@ -12323,262 +13367,6 @@
             <a:spLocks noGrp="1"/>
           </p:cNvSpPr>
           <p:nvPr>
-            <p:ph type="ctrTitle"/>
-          </p:nvPr>
-        </p:nvSpPr>
-        <p:spPr/>
-        <p:txBody>
-          <a:bodyPr/>
-          <a:lstStyle/>
-          <a:p>
-            <a:r>
-              <a:rPr lang="en-US" dirty="0"/>
-              <a:t>Questions?</a:t>
-            </a:r>
-          </a:p>
-        </p:txBody>
-      </p:sp>
-      <p:sp>
-        <p:nvSpPr>
-          <p:cNvPr id="4" name="Subtitle 3">
-            <a:extLst>
-              <a:ext uri="{FF2B5EF4-FFF2-40B4-BE49-F238E27FC236}">
-                <a16:creationId xmlns:a16="http://schemas.microsoft.com/office/drawing/2014/main" id="{8CA0D2D4-009B-421B-86DF-F79A0354C1AB}"/>
-              </a:ext>
-            </a:extLst>
-          </p:cNvPr>
-          <p:cNvSpPr>
-            <a:spLocks noGrp="1"/>
-          </p:cNvSpPr>
-          <p:nvPr>
-            <p:ph type="subTitle" idx="1"/>
-          </p:nvPr>
-        </p:nvSpPr>
-        <p:spPr/>
-        <p:txBody>
-          <a:bodyPr/>
-          <a:lstStyle/>
-          <a:p>
-            <a:endParaRPr lang="en-US"/>
-          </a:p>
-        </p:txBody>
-      </p:sp>
-    </p:spTree>
-    <p:extLst>
-      <p:ext uri="{BB962C8B-B14F-4D97-AF65-F5344CB8AC3E}">
-        <p14:creationId xmlns:p14="http://schemas.microsoft.com/office/powerpoint/2010/main" val="1426011100"/>
-      </p:ext>
-    </p:extLst>
-  </p:cSld>
-  <p:clrMapOvr>
-    <a:masterClrMapping/>
-  </p:clrMapOvr>
-  <mc:AlternateContent xmlns:mc="http://schemas.openxmlformats.org/markup-compatibility/2006" xmlns:p14="http://schemas.microsoft.com/office/powerpoint/2010/main">
-    <mc:Choice Requires="p14">
-      <p:transition p14:dur="0"/>
-    </mc:Choice>
-    <mc:Fallback xmlns="">
-      <p:transition/>
-    </mc:Fallback>
-  </mc:AlternateContent>
-</p:sld>
-</file>
-
-<file path=ppt/slides/slide22.xml><?xml version="1.0" encoding="utf-8"?>
-<p:sld xmlns:a="http://schemas.openxmlformats.org/drawingml/2006/main" xmlns:r="http://schemas.openxmlformats.org/officeDocument/2006/relationships" xmlns:p="http://schemas.openxmlformats.org/presentationml/2006/main">
-  <p:cSld>
-    <p:spTree>
-      <p:nvGrpSpPr>
-        <p:cNvPr id="1" name=""/>
-        <p:cNvGrpSpPr/>
-        <p:nvPr/>
-      </p:nvGrpSpPr>
-      <p:grpSpPr>
-        <a:xfrm>
-          <a:off x="0" y="0"/>
-          <a:ext cx="0" cy="0"/>
-          <a:chOff x="0" y="0"/>
-          <a:chExt cx="0" cy="0"/>
-        </a:xfrm>
-      </p:grpSpPr>
-      <p:sp>
-        <p:nvSpPr>
-          <p:cNvPr id="13" name="Title 12"/>
-          <p:cNvSpPr>
-            <a:spLocks noGrp="1"/>
-          </p:cNvSpPr>
-          <p:nvPr>
-            <p:ph type="title"/>
-          </p:nvPr>
-        </p:nvSpPr>
-        <p:spPr/>
-        <p:txBody>
-          <a:bodyPr/>
-          <a:lstStyle/>
-          <a:p>
-            <a:r>
-              <a:rPr lang="en-US" dirty="0"/>
-              <a:t>Advanced Topics</a:t>
-            </a:r>
-          </a:p>
-        </p:txBody>
-      </p:sp>
-      <p:sp>
-        <p:nvSpPr>
-          <p:cNvPr id="14" name="Content Placeholder 13"/>
-          <p:cNvSpPr>
-            <a:spLocks noGrp="1"/>
-          </p:cNvSpPr>
-          <p:nvPr>
-            <p:ph idx="1"/>
-          </p:nvPr>
-        </p:nvSpPr>
-        <p:spPr/>
-        <p:txBody>
-          <a:bodyPr/>
-          <a:lstStyle/>
-          <a:p>
-            <a:r>
-              <a:rPr lang="en-US" dirty="0"/>
-              <a:t>Mutations &amp; Test Timeouts</a:t>
-            </a:r>
-          </a:p>
-          <a:p>
-            <a:r>
-              <a:rPr lang="en-US" dirty="0"/>
-              <a:t>Other Mutation Types</a:t>
-            </a:r>
-          </a:p>
-          <a:p>
-            <a:r>
-              <a:rPr lang="en-US" dirty="0"/>
-              <a:t>Writing Custom Mutations</a:t>
-            </a:r>
-          </a:p>
-        </p:txBody>
-      </p:sp>
-    </p:spTree>
-    <p:extLst>
-      <p:ext uri="{BB962C8B-B14F-4D97-AF65-F5344CB8AC3E}">
-        <p14:creationId xmlns:p14="http://schemas.microsoft.com/office/powerpoint/2010/main" val="864206668"/>
-      </p:ext>
-    </p:extLst>
-  </p:cSld>
-  <p:clrMapOvr>
-    <a:masterClrMapping/>
-  </p:clrMapOvr>
-  <mc:AlternateContent xmlns:mc="http://schemas.openxmlformats.org/markup-compatibility/2006" xmlns:p14="http://schemas.microsoft.com/office/powerpoint/2010/main">
-    <mc:Choice Requires="p14">
-      <p:transition p14:dur="0"/>
-    </mc:Choice>
-    <mc:Fallback xmlns="">
-      <p:transition/>
-    </mc:Fallback>
-  </mc:AlternateContent>
-</p:sld>
-</file>
-
-<file path=ppt/slides/slide3.xml><?xml version="1.0" encoding="utf-8"?>
-<p:sld xmlns:a="http://schemas.openxmlformats.org/drawingml/2006/main" xmlns:r="http://schemas.openxmlformats.org/officeDocument/2006/relationships" xmlns:p="http://schemas.openxmlformats.org/presentationml/2006/main">
-  <p:cSld>
-    <p:spTree>
-      <p:nvGrpSpPr>
-        <p:cNvPr id="1" name=""/>
-        <p:cNvGrpSpPr/>
-        <p:nvPr/>
-      </p:nvGrpSpPr>
-      <p:grpSpPr>
-        <a:xfrm>
-          <a:off x="0" y="0"/>
-          <a:ext cx="0" cy="0"/>
-          <a:chOff x="0" y="0"/>
-          <a:chExt cx="0" cy="0"/>
-        </a:xfrm>
-      </p:grpSpPr>
-      <p:sp>
-        <p:nvSpPr>
-          <p:cNvPr id="13" name="Title 12"/>
-          <p:cNvSpPr>
-            <a:spLocks noGrp="1"/>
-          </p:cNvSpPr>
-          <p:nvPr>
-            <p:ph type="title"/>
-          </p:nvPr>
-        </p:nvSpPr>
-        <p:spPr/>
-        <p:txBody>
-          <a:bodyPr/>
-          <a:lstStyle/>
-          <a:p>
-            <a:r>
-              <a:rPr lang="en-US" dirty="0"/>
-              <a:t>Code Coverage Demo</a:t>
-            </a:r>
-          </a:p>
-        </p:txBody>
-      </p:sp>
-      <p:sp>
-        <p:nvSpPr>
-          <p:cNvPr id="2" name="Text Placeholder 1"/>
-          <p:cNvSpPr>
-            <a:spLocks noGrp="1"/>
-          </p:cNvSpPr>
-          <p:nvPr>
-            <p:ph type="body" sz="half" idx="2"/>
-          </p:nvPr>
-        </p:nvSpPr>
-        <p:spPr/>
-        <p:txBody>
-          <a:bodyPr/>
-          <a:lstStyle/>
-          <a:p>
-            <a:endParaRPr lang="en-US"/>
-          </a:p>
-        </p:txBody>
-      </p:sp>
-    </p:spTree>
-    <p:extLst>
-      <p:ext uri="{BB962C8B-B14F-4D97-AF65-F5344CB8AC3E}">
-        <p14:creationId xmlns:p14="http://schemas.microsoft.com/office/powerpoint/2010/main" val="4220195126"/>
-      </p:ext>
-    </p:extLst>
-  </p:cSld>
-  <p:clrMapOvr>
-    <a:masterClrMapping/>
-  </p:clrMapOvr>
-</p:sld>
-</file>
-
-<file path=ppt/slides/slide4.xml><?xml version="1.0" encoding="utf-8"?>
-<p:sld xmlns:a="http://schemas.openxmlformats.org/drawingml/2006/main" xmlns:r="http://schemas.openxmlformats.org/officeDocument/2006/relationships" xmlns:p="http://schemas.openxmlformats.org/presentationml/2006/main">
-  <p:cSld>
-    <p:spTree>
-      <p:nvGrpSpPr>
-        <p:cNvPr id="1" name=""/>
-        <p:cNvGrpSpPr/>
-        <p:nvPr/>
-      </p:nvGrpSpPr>
-      <p:grpSpPr>
-        <a:xfrm>
-          <a:off x="0" y="0"/>
-          <a:ext cx="0" cy="0"/>
-          <a:chOff x="0" y="0"/>
-          <a:chExt cx="0" cy="0"/>
-        </a:xfrm>
-      </p:grpSpPr>
-      <p:sp>
-        <p:nvSpPr>
-          <p:cNvPr id="2" name="Title 1">
-            <a:extLst>
-              <a:ext uri="{FF2B5EF4-FFF2-40B4-BE49-F238E27FC236}">
-                <a16:creationId xmlns:a16="http://schemas.microsoft.com/office/drawing/2014/main" id="{4DBA19CA-F161-4303-BC72-5FA16C1E63FF}"/>
-              </a:ext>
-            </a:extLst>
-          </p:cNvPr>
-          <p:cNvSpPr>
-            <a:spLocks noGrp="1"/>
-          </p:cNvSpPr>
-          <p:nvPr>
             <p:ph type="title"/>
           </p:nvPr>
         </p:nvSpPr>
@@ -12626,7 +13414,7 @@
 </p:sld>
 </file>
 
-<file path=ppt/slides/slide5.xml><?xml version="1.0" encoding="utf-8"?>
+<file path=ppt/slides/slide7.xml><?xml version="1.0" encoding="utf-8"?>
 <p:sld xmlns:a="http://schemas.openxmlformats.org/drawingml/2006/main" xmlns:r="http://schemas.openxmlformats.org/officeDocument/2006/relationships" xmlns:p="http://schemas.openxmlformats.org/presentationml/2006/main">
   <p:cSld>
     <p:spTree>
@@ -12976,7 +13764,7 @@
 </p:sld>
 </file>
 
-<file path=ppt/slides/slide6.xml><?xml version="1.0" encoding="utf-8"?>
+<file path=ppt/slides/slide8.xml><?xml version="1.0" encoding="utf-8"?>
 <p:sld xmlns:a="http://schemas.openxmlformats.org/drawingml/2006/main" xmlns:r="http://schemas.openxmlformats.org/officeDocument/2006/relationships" xmlns:p="http://schemas.openxmlformats.org/presentationml/2006/main">
   <p:cSld>
     <p:spTree>
@@ -13305,7 +14093,7 @@
 </p:sld>
 </file>
 
-<file path=ppt/slides/slide7.xml><?xml version="1.0" encoding="utf-8"?>
+<file path=ppt/slides/slide9.xml><?xml version="1.0" encoding="utf-8"?>
 <p:sld xmlns:a="http://schemas.openxmlformats.org/drawingml/2006/main" xmlns:r="http://schemas.openxmlformats.org/officeDocument/2006/relationships" xmlns:p="http://schemas.openxmlformats.org/presentationml/2006/main">
   <p:cSld>
     <p:spTree>
@@ -13576,622 +14364,6 @@
       <p:bldP spid="14" grpId="0" build="p"/>
     </p:bldLst>
   </p:timing>
-</p:sld>
-</file>
-
-<file path=ppt/slides/slide8.xml><?xml version="1.0" encoding="utf-8"?>
-<p:sld xmlns:a="http://schemas.openxmlformats.org/drawingml/2006/main" xmlns:r="http://schemas.openxmlformats.org/officeDocument/2006/relationships" xmlns:p="http://schemas.openxmlformats.org/presentationml/2006/main">
-  <p:cSld>
-    <p:spTree>
-      <p:nvGrpSpPr>
-        <p:cNvPr id="1" name=""/>
-        <p:cNvGrpSpPr/>
-        <p:nvPr/>
-      </p:nvGrpSpPr>
-      <p:grpSpPr>
-        <a:xfrm>
-          <a:off x="0" y="0"/>
-          <a:ext cx="0" cy="0"/>
-          <a:chOff x="0" y="0"/>
-          <a:chExt cx="0" cy="0"/>
-        </a:xfrm>
-      </p:grpSpPr>
-      <p:sp>
-        <p:nvSpPr>
-          <p:cNvPr id="13" name="Title 12"/>
-          <p:cNvSpPr>
-            <a:spLocks noGrp="1"/>
-          </p:cNvSpPr>
-          <p:nvPr>
-            <p:ph type="title"/>
-          </p:nvPr>
-        </p:nvSpPr>
-        <p:spPr/>
-        <p:txBody>
-          <a:bodyPr/>
-          <a:lstStyle/>
-          <a:p>
-            <a:r>
-              <a:rPr lang="en-US" dirty="0"/>
-              <a:t>Mutation Testing Tools</a:t>
-            </a:r>
-          </a:p>
-        </p:txBody>
-      </p:sp>
-      <p:sp>
-        <p:nvSpPr>
-          <p:cNvPr id="14" name="Content Placeholder 13"/>
-          <p:cNvSpPr>
-            <a:spLocks noGrp="1"/>
-          </p:cNvSpPr>
-          <p:nvPr>
-            <p:ph idx="1"/>
-          </p:nvPr>
-        </p:nvSpPr>
-        <p:spPr/>
-        <p:txBody>
-          <a:bodyPr>
-            <a:normAutofit/>
-          </a:bodyPr>
-          <a:lstStyle/>
-          <a:p>
-            <a:r>
-              <a:rPr lang="en-US" dirty="0"/>
-              <a:t>Java</a:t>
-            </a:r>
-          </a:p>
-          <a:p>
-            <a:pPr lvl="1"/>
-            <a:r>
-              <a:rPr lang="en-US" dirty="0"/>
-              <a:t>PIT - </a:t>
-            </a:r>
-            <a:r>
-              <a:rPr lang="en-US" dirty="0">
-                <a:hlinkClick r:id="rId3"/>
-              </a:rPr>
-              <a:t>http://pitest.org/</a:t>
-            </a:r>
-            <a:endParaRPr lang="en-US" dirty="0"/>
-          </a:p>
-          <a:p>
-            <a:pPr lvl="1"/>
-            <a:r>
-              <a:rPr lang="en-US" dirty="0"/>
-              <a:t>Major mutation framework - </a:t>
-            </a:r>
-            <a:r>
-              <a:rPr lang="en-US" dirty="0">
-                <a:hlinkClick r:id="rId4"/>
-              </a:rPr>
-              <a:t>http://mutation-testing.org/</a:t>
-            </a:r>
-            <a:r>
-              <a:rPr lang="en-US" dirty="0"/>
-              <a:t> </a:t>
-            </a:r>
-          </a:p>
-          <a:p>
-            <a:r>
-              <a:rPr lang="en-US" dirty="0"/>
-              <a:t>C#</a:t>
-            </a:r>
-          </a:p>
-          <a:p>
-            <a:pPr lvl="1"/>
-            <a:r>
-              <a:rPr lang="en-US" dirty="0" err="1"/>
-              <a:t>VisualMutator</a:t>
-            </a:r>
-            <a:r>
-              <a:rPr lang="en-US" dirty="0"/>
-              <a:t> - </a:t>
-            </a:r>
-            <a:r>
-              <a:rPr lang="en-US" dirty="0">
-                <a:hlinkClick r:id="rId5"/>
-              </a:rPr>
-              <a:t>http://visualmutator.github.io/web/</a:t>
-            </a:r>
-            <a:r>
-              <a:rPr lang="en-US" dirty="0"/>
-              <a:t> </a:t>
-            </a:r>
-          </a:p>
-          <a:p>
-            <a:pPr lvl="1"/>
-            <a:r>
-              <a:rPr lang="en-US" dirty="0" err="1"/>
-              <a:t>NinjaTurtles</a:t>
-            </a:r>
-            <a:r>
-              <a:rPr lang="en-US" dirty="0"/>
-              <a:t> - </a:t>
-            </a:r>
-            <a:r>
-              <a:rPr lang="en-US" dirty="0">
-                <a:hlinkClick r:id="rId6"/>
-              </a:rPr>
-              <a:t>http://www.mutation-testing.net/</a:t>
-            </a:r>
-            <a:r>
-              <a:rPr lang="en-US" dirty="0"/>
-              <a:t> </a:t>
-            </a:r>
-            <a:r>
-              <a:rPr lang="en-US" sz="2400" dirty="0"/>
-              <a:t>(orphaned)</a:t>
-            </a:r>
-          </a:p>
-          <a:p>
-            <a:r>
-              <a:rPr lang="en-US" dirty="0"/>
-              <a:t>JavaScript / TypeScript</a:t>
-            </a:r>
-          </a:p>
-          <a:p>
-            <a:pPr lvl="1"/>
-            <a:r>
-              <a:rPr lang="en-US" dirty="0"/>
-              <a:t>Stryker - </a:t>
-            </a:r>
-            <a:r>
-              <a:rPr lang="en-US" dirty="0">
-                <a:hlinkClick r:id="rId7"/>
-              </a:rPr>
-              <a:t>https://stryker-mutator.io/</a:t>
-            </a:r>
-            <a:r>
-              <a:rPr lang="en-US" dirty="0"/>
-              <a:t> (C# &amp; Scala)</a:t>
-            </a:r>
-          </a:p>
-        </p:txBody>
-      </p:sp>
-    </p:spTree>
-    <p:extLst>
-      <p:ext uri="{BB962C8B-B14F-4D97-AF65-F5344CB8AC3E}">
-        <p14:creationId xmlns:p14="http://schemas.microsoft.com/office/powerpoint/2010/main" val="1019865085"/>
-      </p:ext>
-    </p:extLst>
-  </p:cSld>
-  <p:clrMapOvr>
-    <a:masterClrMapping/>
-  </p:clrMapOvr>
-  <mc:AlternateContent xmlns:mc="http://schemas.openxmlformats.org/markup-compatibility/2006" xmlns:p14="http://schemas.microsoft.com/office/powerpoint/2010/main">
-    <mc:Choice Requires="p14">
-      <p:transition p14:dur="0"/>
-    </mc:Choice>
-    <mc:Fallback xmlns="">
-      <p:transition/>
-    </mc:Fallback>
-  </mc:AlternateContent>
-  <p:timing>
-    <p:tnLst>
-      <p:par>
-        <p:cTn id="1" dur="indefinite" restart="never" nodeType="tmRoot">
-          <p:childTnLst>
-            <p:seq concurrent="1" nextAc="seek">
-              <p:cTn id="2" dur="indefinite" nodeType="mainSeq">
-                <p:childTnLst>
-                  <p:par>
-                    <p:cTn id="3" fill="hold">
-                      <p:stCondLst>
-                        <p:cond delay="indefinite"/>
-                      </p:stCondLst>
-                      <p:childTnLst>
-                        <p:par>
-                          <p:cTn id="4" fill="hold">
-                            <p:stCondLst>
-                              <p:cond delay="0"/>
-                            </p:stCondLst>
-                            <p:childTnLst>
-                              <p:par>
-                                <p:cTn id="5" presetID="1" presetClass="entr" presetSubtype="0" fill="hold" grpId="0" nodeType="clickEffect">
-                                  <p:stCondLst>
-                                    <p:cond delay="0"/>
-                                  </p:stCondLst>
-                                  <p:childTnLst>
-                                    <p:set>
-                                      <p:cBhvr>
-                                        <p:cTn id="6" dur="1" fill="hold">
-                                          <p:stCondLst>
-                                            <p:cond delay="0"/>
-                                          </p:stCondLst>
-                                        </p:cTn>
-                                        <p:tgtEl>
-                                          <p:spTgt spid="14">
-                                            <p:txEl>
-                                              <p:pRg st="0" end="0"/>
-                                            </p:txEl>
-                                          </p:spTgt>
-                                        </p:tgtEl>
-                                        <p:attrNameLst>
-                                          <p:attrName>style.visibility</p:attrName>
-                                        </p:attrNameLst>
-                                      </p:cBhvr>
-                                      <p:to>
-                                        <p:strVal val="visible"/>
-                                      </p:to>
-                                    </p:set>
-                                  </p:childTnLst>
-                                </p:cTn>
-                              </p:par>
-                              <p:par>
-                                <p:cTn id="7" presetID="1" presetClass="entr" presetSubtype="0" fill="hold" grpId="0" nodeType="withEffect">
-                                  <p:stCondLst>
-                                    <p:cond delay="0"/>
-                                  </p:stCondLst>
-                                  <p:childTnLst>
-                                    <p:set>
-                                      <p:cBhvr>
-                                        <p:cTn id="8" dur="1" fill="hold">
-                                          <p:stCondLst>
-                                            <p:cond delay="0"/>
-                                          </p:stCondLst>
-                                        </p:cTn>
-                                        <p:tgtEl>
-                                          <p:spTgt spid="14">
-                                            <p:txEl>
-                                              <p:pRg st="1" end="1"/>
-                                            </p:txEl>
-                                          </p:spTgt>
-                                        </p:tgtEl>
-                                        <p:attrNameLst>
-                                          <p:attrName>style.visibility</p:attrName>
-                                        </p:attrNameLst>
-                                      </p:cBhvr>
-                                      <p:to>
-                                        <p:strVal val="visible"/>
-                                      </p:to>
-                                    </p:set>
-                                  </p:childTnLst>
-                                </p:cTn>
-                              </p:par>
-                              <p:par>
-                                <p:cTn id="9" presetID="1" presetClass="entr" presetSubtype="0" fill="hold" grpId="0" nodeType="withEffect">
-                                  <p:stCondLst>
-                                    <p:cond delay="0"/>
-                                  </p:stCondLst>
-                                  <p:childTnLst>
-                                    <p:set>
-                                      <p:cBhvr>
-                                        <p:cTn id="10" dur="1" fill="hold">
-                                          <p:stCondLst>
-                                            <p:cond delay="0"/>
-                                          </p:stCondLst>
-                                        </p:cTn>
-                                        <p:tgtEl>
-                                          <p:spTgt spid="14">
-                                            <p:txEl>
-                                              <p:pRg st="2" end="2"/>
-                                            </p:txEl>
-                                          </p:spTgt>
-                                        </p:tgtEl>
-                                        <p:attrNameLst>
-                                          <p:attrName>style.visibility</p:attrName>
-                                        </p:attrNameLst>
-                                      </p:cBhvr>
-                                      <p:to>
-                                        <p:strVal val="visible"/>
-                                      </p:to>
-                                    </p:set>
-                                  </p:childTnLst>
-                                </p:cTn>
-                              </p:par>
-                            </p:childTnLst>
-                          </p:cTn>
-                        </p:par>
-                      </p:childTnLst>
-                    </p:cTn>
-                  </p:par>
-                  <p:par>
-                    <p:cTn id="11" fill="hold">
-                      <p:stCondLst>
-                        <p:cond delay="indefinite"/>
-                      </p:stCondLst>
-                      <p:childTnLst>
-                        <p:par>
-                          <p:cTn id="12" fill="hold">
-                            <p:stCondLst>
-                              <p:cond delay="0"/>
-                            </p:stCondLst>
-                            <p:childTnLst>
-                              <p:par>
-                                <p:cTn id="13" presetID="1" presetClass="entr" presetSubtype="0" fill="hold" grpId="0" nodeType="clickEffect">
-                                  <p:stCondLst>
-                                    <p:cond delay="0"/>
-                                  </p:stCondLst>
-                                  <p:childTnLst>
-                                    <p:set>
-                                      <p:cBhvr>
-                                        <p:cTn id="14" dur="1" fill="hold">
-                                          <p:stCondLst>
-                                            <p:cond delay="0"/>
-                                          </p:stCondLst>
-                                        </p:cTn>
-                                        <p:tgtEl>
-                                          <p:spTgt spid="14">
-                                            <p:txEl>
-                                              <p:pRg st="3" end="3"/>
-                                            </p:txEl>
-                                          </p:spTgt>
-                                        </p:tgtEl>
-                                        <p:attrNameLst>
-                                          <p:attrName>style.visibility</p:attrName>
-                                        </p:attrNameLst>
-                                      </p:cBhvr>
-                                      <p:to>
-                                        <p:strVal val="visible"/>
-                                      </p:to>
-                                    </p:set>
-                                  </p:childTnLst>
-                                </p:cTn>
-                              </p:par>
-                              <p:par>
-                                <p:cTn id="15" presetID="1" presetClass="entr" presetSubtype="0" fill="hold" grpId="0" nodeType="withEffect">
-                                  <p:stCondLst>
-                                    <p:cond delay="0"/>
-                                  </p:stCondLst>
-                                  <p:childTnLst>
-                                    <p:set>
-                                      <p:cBhvr>
-                                        <p:cTn id="16" dur="1" fill="hold">
-                                          <p:stCondLst>
-                                            <p:cond delay="0"/>
-                                          </p:stCondLst>
-                                        </p:cTn>
-                                        <p:tgtEl>
-                                          <p:spTgt spid="14">
-                                            <p:txEl>
-                                              <p:pRg st="4" end="4"/>
-                                            </p:txEl>
-                                          </p:spTgt>
-                                        </p:tgtEl>
-                                        <p:attrNameLst>
-                                          <p:attrName>style.visibility</p:attrName>
-                                        </p:attrNameLst>
-                                      </p:cBhvr>
-                                      <p:to>
-                                        <p:strVal val="visible"/>
-                                      </p:to>
-                                    </p:set>
-                                  </p:childTnLst>
-                                </p:cTn>
-                              </p:par>
-                              <p:par>
-                                <p:cTn id="17" presetID="1" presetClass="entr" presetSubtype="0" fill="hold" grpId="0" nodeType="withEffect">
-                                  <p:stCondLst>
-                                    <p:cond delay="0"/>
-                                  </p:stCondLst>
-                                  <p:childTnLst>
-                                    <p:set>
-                                      <p:cBhvr>
-                                        <p:cTn id="18" dur="1" fill="hold">
-                                          <p:stCondLst>
-                                            <p:cond delay="0"/>
-                                          </p:stCondLst>
-                                        </p:cTn>
-                                        <p:tgtEl>
-                                          <p:spTgt spid="14">
-                                            <p:txEl>
-                                              <p:pRg st="5" end="5"/>
-                                            </p:txEl>
-                                          </p:spTgt>
-                                        </p:tgtEl>
-                                        <p:attrNameLst>
-                                          <p:attrName>style.visibility</p:attrName>
-                                        </p:attrNameLst>
-                                      </p:cBhvr>
-                                      <p:to>
-                                        <p:strVal val="visible"/>
-                                      </p:to>
-                                    </p:set>
-                                  </p:childTnLst>
-                                </p:cTn>
-                              </p:par>
-                            </p:childTnLst>
-                          </p:cTn>
-                        </p:par>
-                      </p:childTnLst>
-                    </p:cTn>
-                  </p:par>
-                  <p:par>
-                    <p:cTn id="19" fill="hold">
-                      <p:stCondLst>
-                        <p:cond delay="indefinite"/>
-                      </p:stCondLst>
-                      <p:childTnLst>
-                        <p:par>
-                          <p:cTn id="20" fill="hold">
-                            <p:stCondLst>
-                              <p:cond delay="0"/>
-                            </p:stCondLst>
-                            <p:childTnLst>
-                              <p:par>
-                                <p:cTn id="21" presetID="1" presetClass="entr" presetSubtype="0" fill="hold" grpId="0" nodeType="clickEffect">
-                                  <p:stCondLst>
-                                    <p:cond delay="0"/>
-                                  </p:stCondLst>
-                                  <p:childTnLst>
-                                    <p:set>
-                                      <p:cBhvr>
-                                        <p:cTn id="22" dur="1" fill="hold">
-                                          <p:stCondLst>
-                                            <p:cond delay="0"/>
-                                          </p:stCondLst>
-                                        </p:cTn>
-                                        <p:tgtEl>
-                                          <p:spTgt spid="14">
-                                            <p:txEl>
-                                              <p:pRg st="6" end="6"/>
-                                            </p:txEl>
-                                          </p:spTgt>
-                                        </p:tgtEl>
-                                        <p:attrNameLst>
-                                          <p:attrName>style.visibility</p:attrName>
-                                        </p:attrNameLst>
-                                      </p:cBhvr>
-                                      <p:to>
-                                        <p:strVal val="visible"/>
-                                      </p:to>
-                                    </p:set>
-                                  </p:childTnLst>
-                                </p:cTn>
-                              </p:par>
-                              <p:par>
-                                <p:cTn id="23" presetID="1" presetClass="entr" presetSubtype="0" fill="hold" grpId="0" nodeType="withEffect">
-                                  <p:stCondLst>
-                                    <p:cond delay="0"/>
-                                  </p:stCondLst>
-                                  <p:childTnLst>
-                                    <p:set>
-                                      <p:cBhvr>
-                                        <p:cTn id="24" dur="1" fill="hold">
-                                          <p:stCondLst>
-                                            <p:cond delay="0"/>
-                                          </p:stCondLst>
-                                        </p:cTn>
-                                        <p:tgtEl>
-                                          <p:spTgt spid="14">
-                                            <p:txEl>
-                                              <p:pRg st="7" end="7"/>
-                                            </p:txEl>
-                                          </p:spTgt>
-                                        </p:tgtEl>
-                                        <p:attrNameLst>
-                                          <p:attrName>style.visibility</p:attrName>
-                                        </p:attrNameLst>
-                                      </p:cBhvr>
-                                      <p:to>
-                                        <p:strVal val="visible"/>
-                                      </p:to>
-                                    </p:set>
-                                  </p:childTnLst>
-                                </p:cTn>
-                              </p:par>
-                            </p:childTnLst>
-                          </p:cTn>
-                        </p:par>
-                      </p:childTnLst>
-                    </p:cTn>
-                  </p:par>
-                </p:childTnLst>
-              </p:cTn>
-              <p:prevCondLst>
-                <p:cond evt="onPrev" delay="0">
-                  <p:tgtEl>
-                    <p:sldTgt/>
-                  </p:tgtEl>
-                </p:cond>
-              </p:prevCondLst>
-              <p:nextCondLst>
-                <p:cond evt="onNext" delay="0">
-                  <p:tgtEl>
-                    <p:sldTgt/>
-                  </p:tgtEl>
-                </p:cond>
-              </p:nextCondLst>
-            </p:seq>
-          </p:childTnLst>
-        </p:cTn>
-      </p:par>
-    </p:tnLst>
-    <p:bldLst>
-      <p:bldP spid="14" grpId="0" uiExpand="1" build="p"/>
-    </p:bldLst>
-  </p:timing>
-</p:sld>
-</file>
-
-<file path=ppt/slides/slide9.xml><?xml version="1.0" encoding="utf-8"?>
-<p:sld xmlns:a="http://schemas.openxmlformats.org/drawingml/2006/main" xmlns:r="http://schemas.openxmlformats.org/officeDocument/2006/relationships" xmlns:p="http://schemas.openxmlformats.org/presentationml/2006/main">
-  <p:cSld>
-    <p:spTree>
-      <p:nvGrpSpPr>
-        <p:cNvPr id="1" name=""/>
-        <p:cNvGrpSpPr/>
-        <p:nvPr/>
-      </p:nvGrpSpPr>
-      <p:grpSpPr>
-        <a:xfrm>
-          <a:off x="0" y="0"/>
-          <a:ext cx="0" cy="0"/>
-          <a:chOff x="0" y="0"/>
-          <a:chExt cx="0" cy="0"/>
-        </a:xfrm>
-      </p:grpSpPr>
-      <p:sp>
-        <p:nvSpPr>
-          <p:cNvPr id="2" name="Title 1">
-            <a:extLst>
-              <a:ext uri="{FF2B5EF4-FFF2-40B4-BE49-F238E27FC236}">
-                <a16:creationId xmlns:a16="http://schemas.microsoft.com/office/drawing/2014/main" id="{4DBA19CA-F161-4303-BC72-5FA16C1E63FF}"/>
-              </a:ext>
-            </a:extLst>
-          </p:cNvPr>
-          <p:cNvSpPr>
-            <a:spLocks noGrp="1"/>
-          </p:cNvSpPr>
-          <p:nvPr>
-            <p:ph type="ctrTitle"/>
-          </p:nvPr>
-        </p:nvSpPr>
-        <p:spPr/>
-        <p:txBody>
-          <a:bodyPr/>
-          <a:lstStyle/>
-          <a:p>
-            <a:r>
-              <a:rPr lang="en-US" dirty="0"/>
-              <a:t>Mutation Testing Tool Example</a:t>
-            </a:r>
-          </a:p>
-        </p:txBody>
-      </p:sp>
-      <p:sp>
-        <p:nvSpPr>
-          <p:cNvPr id="4" name="Subtitle 3">
-            <a:extLst>
-              <a:ext uri="{FF2B5EF4-FFF2-40B4-BE49-F238E27FC236}">
-                <a16:creationId xmlns:a16="http://schemas.microsoft.com/office/drawing/2014/main" id="{8CA0D2D4-009B-421B-86DF-F79A0354C1AB}"/>
-              </a:ext>
-            </a:extLst>
-          </p:cNvPr>
-          <p:cNvSpPr>
-            <a:spLocks noGrp="1"/>
-          </p:cNvSpPr>
-          <p:nvPr>
-            <p:ph type="subTitle" idx="1"/>
-          </p:nvPr>
-        </p:nvSpPr>
-        <p:spPr/>
-        <p:txBody>
-          <a:bodyPr/>
-          <a:lstStyle/>
-          <a:p>
-            <a:endParaRPr lang="en-US"/>
-          </a:p>
-        </p:txBody>
-      </p:sp>
-    </p:spTree>
-    <p:extLst>
-      <p:ext uri="{BB962C8B-B14F-4D97-AF65-F5344CB8AC3E}">
-        <p14:creationId xmlns:p14="http://schemas.microsoft.com/office/powerpoint/2010/main" val="2171408198"/>
-      </p:ext>
-    </p:extLst>
-  </p:cSld>
-  <p:clrMapOvr>
-    <a:masterClrMapping/>
-  </p:clrMapOvr>
-  <mc:AlternateContent xmlns:mc="http://schemas.openxmlformats.org/markup-compatibility/2006" xmlns:p14="http://schemas.microsoft.com/office/powerpoint/2010/main">
-    <mc:Choice Requires="p14">
-      <p:transition p14:dur="0"/>
-    </mc:Choice>
-    <mc:Fallback xmlns="">
-      <p:transition/>
-    </mc:Fallback>
-  </mc:AlternateContent>
 </p:sld>
 </file>
 
@@ -15056,6 +15228,15 @@
 </file>
 
 <file path=customXml/item1.xml><?xml version="1.0" encoding="utf-8"?>
+<?mso-contentType ?>
+<FormTemplates xmlns="http://schemas.microsoft.com/sharepoint/v3/contenttype/forms">
+  <Display>DocumentLibraryForm</Display>
+  <Edit>DocumentLibraryForm</Edit>
+  <New>DocumentLibraryForm</New>
+</FormTemplates>
+</file>
+
+<file path=customXml/item2.xml><?xml version="1.0" encoding="utf-8"?>
 <ct:contentTypeSchema xmlns:ct="http://schemas.microsoft.com/office/2006/metadata/contentType" xmlns:ma="http://schemas.microsoft.com/office/2006/metadata/properties/metaAttributes" ct:_="" ma:_="" ma:contentTypeName="Document" ma:contentTypeID="0x010100AA3F7D94069FF64A86F7DFF56D60E3BE" ma:contentTypeVersion="6" ma:contentTypeDescription="Create a new document." ma:contentTypeScope="" ma:versionID="c32302c77d4085ecf495bdddb7f5e889">
   <xsd:schema xmlns:xsd="http://www.w3.org/2001/XMLSchema" xmlns:xs="http://www.w3.org/2001/XMLSchema" xmlns:p="http://schemas.microsoft.com/office/2006/metadata/properties" xmlns:ns2="a4f35948-e619-41b3-aa29-22878b09cfd2" xmlns:ns3="40262f94-9f35-4ac3-9a90-690165a166b7" targetNamespace="http://schemas.microsoft.com/office/2006/metadata/properties" ma:root="true" ma:fieldsID="4ab5ae46be95f9d0be6107e8200be7a2" ns2:_="" ns3:_="">
     <xsd:import namespace="a4f35948-e619-41b3-aa29-22878b09cfd2"/>
@@ -15236,15 +15417,6 @@
 </ct:contentTypeSchema>
 </file>
 
-<file path=customXml/item2.xml><?xml version="1.0" encoding="utf-8"?>
-<?mso-contentType ?>
-<FormTemplates xmlns="http://schemas.microsoft.com/sharepoint/v3/contenttype/forms">
-  <Display>DocumentLibraryForm</Display>
-  <Edit>DocumentLibraryForm</Edit>
-  <New>DocumentLibraryForm</New>
-</FormTemplates>
-</file>
-
 <file path=customXml/item3.xml><?xml version="1.0" encoding="utf-8"?>
 <p:properties xmlns:p="http://schemas.microsoft.com/office/2006/metadata/properties" xmlns:xsi="http://www.w3.org/2001/XMLSchema-instance" xmlns:pc="http://schemas.microsoft.com/office/infopath/2007/PartnerControls">
   <documentManagement>
@@ -15257,6 +15429,14 @@
 </file>
 
 <file path=customXml/itemProps1.xml><?xml version="1.0" encoding="utf-8"?>
+<ds:datastoreItem xmlns:ds="http://schemas.openxmlformats.org/officeDocument/2006/customXml" ds:itemID="{4FC28D37-012A-4F78-8189-E37D3400689D}">
+  <ds:schemaRefs>
+    <ds:schemaRef ds:uri="http://schemas.microsoft.com/sharepoint/v3/contenttype/forms"/>
+  </ds:schemaRefs>
+</ds:datastoreItem>
+</file>
+
+<file path=customXml/itemProps2.xml><?xml version="1.0" encoding="utf-8"?>
 <ds:datastoreItem xmlns:ds="http://schemas.openxmlformats.org/officeDocument/2006/customXml" ds:itemID="{B6B1B62E-928A-4006-B97D-326E5E8B4F15}">
   <ds:schemaRefs>
     <ds:schemaRef ds:uri="http://schemas.microsoft.com/office/2006/metadata/contentType"/>
@@ -15271,14 +15451,6 @@
     <ds:schemaRef ds:uri="http://purl.org/dc/elements/1.1/"/>
     <ds:schemaRef ds:uri="http://purl.org/dc/terms/"/>
     <ds:schemaRef ds:uri="http://schemas.microsoft.com/internal/obd"/>
-  </ds:schemaRefs>
-</ds:datastoreItem>
-</file>
-
-<file path=customXml/itemProps2.xml><?xml version="1.0" encoding="utf-8"?>
-<ds:datastoreItem xmlns:ds="http://schemas.openxmlformats.org/officeDocument/2006/customXml" ds:itemID="{4FC28D37-012A-4F78-8189-E37D3400689D}">
-  <ds:schemaRefs>
-    <ds:schemaRef ds:uri="http://schemas.microsoft.com/sharepoint/v3/contenttype/forms"/>
   </ds:schemaRefs>
 </ds:datastoreItem>
 </file>

</xml_diff>